<commit_message>
Ausbesserung Aufgaben a und b
</commit_message>
<xml_diff>
--- a/Blatt-10/Übungsblatt10.1.pptx
+++ b/Blatt-10/Übungsblatt10.1.pptx
@@ -9,8 +9,9 @@
     <p:sldId id="257" r:id="rId3"/>
     <p:sldId id="258" r:id="rId4"/>
     <p:sldId id="259" r:id="rId5"/>
-    <p:sldId id="262" r:id="rId6"/>
-    <p:sldId id="263" r:id="rId7"/>
+    <p:sldId id="264" r:id="rId6"/>
+    <p:sldId id="265" r:id="rId7"/>
+    <p:sldId id="263" r:id="rId8"/>
   </p:sldIdLst>
   <p:sldSz cx="12192000" cy="6858000"/>
   <p:notesSz cx="6858000" cy="9144000"/>
@@ -109,6 +110,11 @@
       </a:defRPr>
     </a:lvl9pPr>
   </p:defaultTextStyle>
+  <p:extLst>
+    <p:ext uri="{EFAFB233-063F-42B5-8137-9DF3F51BA10A}">
+      <p15:sldGuideLst xmlns:p15="http://schemas.microsoft.com/office/powerpoint/2012/main"/>
+    </p:ext>
+  </p:extLst>
 </p:presentation>
 </file>
 
@@ -242,7 +248,7 @@
           </a:lstStyle>
           <a:p>
             <a:r>
-              <a:rPr lang="de-DE" smtClean="0"/>
+              <a:rPr lang="de-DE"/>
               <a:t>Titelmasterformat durch Klicken bearbeiten</a:t>
             </a:r>
             <a:endParaRPr lang="en-US" dirty="0"/>
@@ -314,7 +320,7 @@
           </a:lstStyle>
           <a:p>
             <a:r>
-              <a:rPr lang="de-DE" smtClean="0"/>
+              <a:rPr lang="de-DE"/>
               <a:t>Formatvorlage des Untertitelmasters durch Klicken bearbeiten</a:t>
             </a:r>
             <a:endParaRPr lang="en-US" dirty="0"/>
@@ -338,7 +344,7 @@
           <a:p>
             <a:fld id="{4BDF68E2-58F2-4D09-BE8B-E3BD06533059}" type="datetimeFigureOut">
               <a:rPr lang="en-US" dirty="0"/>
-              <a:t>1/18/2017</a:t>
+              <a:t>1/20/2017</a:t>
             </a:fld>
             <a:endParaRPr lang="en-US" dirty="0"/>
           </a:p>
@@ -465,7 +471,7 @@
           <a:lstStyle/>
           <a:p>
             <a:r>
-              <a:rPr lang="de-DE" smtClean="0"/>
+              <a:rPr lang="de-DE"/>
               <a:t>Titelmasterformat durch Klicken bearbeiten</a:t>
             </a:r>
             <a:endParaRPr lang="en-US" dirty="0"/>
@@ -489,35 +495,35 @@
           <a:p>
             <a:pPr lvl="0"/>
             <a:r>
-              <a:rPr lang="de-DE" smtClean="0"/>
+              <a:rPr lang="de-DE"/>
               <a:t>Formatvorlagen des Textmasters bearbeiten</a:t>
             </a:r>
           </a:p>
           <a:p>
             <a:pPr lvl="1"/>
             <a:r>
-              <a:rPr lang="de-DE" smtClean="0"/>
+              <a:rPr lang="de-DE"/>
               <a:t>Zweite Ebene</a:t>
             </a:r>
           </a:p>
           <a:p>
             <a:pPr lvl="2"/>
             <a:r>
-              <a:rPr lang="de-DE" smtClean="0"/>
+              <a:rPr lang="de-DE"/>
               <a:t>Dritte Ebene</a:t>
             </a:r>
           </a:p>
           <a:p>
             <a:pPr lvl="3"/>
             <a:r>
-              <a:rPr lang="de-DE" smtClean="0"/>
+              <a:rPr lang="de-DE"/>
               <a:t>Vierte Ebene</a:t>
             </a:r>
           </a:p>
           <a:p>
             <a:pPr lvl="4"/>
             <a:r>
-              <a:rPr lang="de-DE" smtClean="0"/>
+              <a:rPr lang="de-DE"/>
               <a:t>Fünfte Ebene</a:t>
             </a:r>
             <a:endParaRPr lang="en-US" dirty="0"/>
@@ -541,7 +547,7 @@
           <a:p>
             <a:fld id="{2E2D6473-DF6D-4702-B328-E0DD40540A4E}" type="datetimeFigureOut">
               <a:rPr lang="en-US" dirty="0"/>
-              <a:t>1/18/2017</a:t>
+              <a:t>1/20/2017</a:t>
             </a:fld>
             <a:endParaRPr lang="en-US" dirty="0"/>
           </a:p>
@@ -711,7 +717,7 @@
           <a:lstStyle/>
           <a:p>
             <a:r>
-              <a:rPr lang="de-DE" smtClean="0"/>
+              <a:rPr lang="de-DE"/>
               <a:t>Titelmasterformat durch Klicken bearbeiten</a:t>
             </a:r>
             <a:endParaRPr lang="en-US" dirty="0"/>
@@ -740,35 +746,35 @@
           <a:p>
             <a:pPr lvl="0"/>
             <a:r>
-              <a:rPr lang="de-DE" smtClean="0"/>
+              <a:rPr lang="de-DE"/>
               <a:t>Formatvorlagen des Textmasters bearbeiten</a:t>
             </a:r>
           </a:p>
           <a:p>
             <a:pPr lvl="1"/>
             <a:r>
-              <a:rPr lang="de-DE" smtClean="0"/>
+              <a:rPr lang="de-DE"/>
               <a:t>Zweite Ebene</a:t>
             </a:r>
           </a:p>
           <a:p>
             <a:pPr lvl="2"/>
             <a:r>
-              <a:rPr lang="de-DE" smtClean="0"/>
+              <a:rPr lang="de-DE"/>
               <a:t>Dritte Ebene</a:t>
             </a:r>
           </a:p>
           <a:p>
             <a:pPr lvl="3"/>
             <a:r>
-              <a:rPr lang="de-DE" smtClean="0"/>
+              <a:rPr lang="de-DE"/>
               <a:t>Vierte Ebene</a:t>
             </a:r>
           </a:p>
           <a:p>
             <a:pPr lvl="4"/>
             <a:r>
-              <a:rPr lang="de-DE" smtClean="0"/>
+              <a:rPr lang="de-DE"/>
               <a:t>Fünfte Ebene</a:t>
             </a:r>
             <a:endParaRPr lang="en-US" dirty="0"/>
@@ -792,7 +798,7 @@
           <a:p>
             <a:fld id="{E26F7E3A-B166-407D-9866-32884E7D5B37}" type="datetimeFigureOut">
               <a:rPr lang="en-US" dirty="0"/>
-              <a:t>1/18/2017</a:t>
+              <a:t>1/20/2017</a:t>
             </a:fld>
             <a:endParaRPr lang="en-US" dirty="0"/>
           </a:p>
@@ -885,7 +891,7 @@
           </a:lstStyle>
           <a:p>
             <a:r>
-              <a:rPr lang="de-DE" smtClean="0"/>
+              <a:rPr lang="de-DE"/>
               <a:t>Titelmasterformat durch Klicken bearbeiten</a:t>
             </a:r>
             <a:endParaRPr lang="en-US" dirty="0"/>
@@ -909,35 +915,35 @@
           <a:p>
             <a:pPr lvl="0"/>
             <a:r>
-              <a:rPr lang="de-DE" smtClean="0"/>
+              <a:rPr lang="de-DE"/>
               <a:t>Formatvorlagen des Textmasters bearbeiten</a:t>
             </a:r>
           </a:p>
           <a:p>
             <a:pPr lvl="1"/>
             <a:r>
-              <a:rPr lang="de-DE" smtClean="0"/>
+              <a:rPr lang="de-DE"/>
               <a:t>Zweite Ebene</a:t>
             </a:r>
           </a:p>
           <a:p>
             <a:pPr lvl="2"/>
             <a:r>
-              <a:rPr lang="de-DE" smtClean="0"/>
+              <a:rPr lang="de-DE"/>
               <a:t>Dritte Ebene</a:t>
             </a:r>
           </a:p>
           <a:p>
             <a:pPr lvl="3"/>
             <a:r>
-              <a:rPr lang="de-DE" smtClean="0"/>
+              <a:rPr lang="de-DE"/>
               <a:t>Vierte Ebene</a:t>
             </a:r>
           </a:p>
           <a:p>
             <a:pPr lvl="4"/>
             <a:r>
-              <a:rPr lang="de-DE" smtClean="0"/>
+              <a:rPr lang="de-DE"/>
               <a:t>Fünfte Ebene</a:t>
             </a:r>
             <a:endParaRPr lang="en-US" dirty="0"/>
@@ -961,7 +967,7 @@
           <a:p>
             <a:fld id="{528FC5F6-F338-4AE4-BB23-26385BCFC423}" type="datetimeFigureOut">
               <a:rPr lang="en-US" dirty="0"/>
-              <a:t>1/18/2017</a:t>
+              <a:t>1/20/2017</a:t>
             </a:fld>
             <a:endParaRPr lang="en-US" dirty="0"/>
           </a:p>
@@ -1155,7 +1161,7 @@
           </a:lstStyle>
           <a:p>
             <a:r>
-              <a:rPr lang="de-DE" smtClean="0"/>
+              <a:rPr lang="de-DE"/>
               <a:t>Titelmasterformat durch Klicken bearbeiten</a:t>
             </a:r>
             <a:endParaRPr lang="en-US" dirty="0"/>
@@ -1276,7 +1282,7 @@
           <a:p>
             <a:pPr lvl="0"/>
             <a:r>
-              <a:rPr lang="de-DE" smtClean="0"/>
+              <a:rPr lang="de-DE"/>
               <a:t>Formatvorlagen des Textmasters bearbeiten</a:t>
             </a:r>
           </a:p>
@@ -1299,7 +1305,7 @@
           <a:p>
             <a:fld id="{20EBB0C4-6273-4C6E-B9BD-2EDC30F1CD52}" type="datetimeFigureOut">
               <a:rPr lang="en-US" dirty="0"/>
-              <a:t>1/18/2017</a:t>
+              <a:t>1/20/2017</a:t>
             </a:fld>
             <a:endParaRPr lang="en-US" dirty="0"/>
           </a:p>
@@ -1431,7 +1437,7 @@
           <a:lstStyle/>
           <a:p>
             <a:r>
-              <a:rPr lang="de-DE" smtClean="0"/>
+              <a:rPr lang="de-DE"/>
               <a:t>Titelmasterformat durch Klicken bearbeiten</a:t>
             </a:r>
             <a:endParaRPr lang="en-US" dirty="0"/>
@@ -1460,35 +1466,35 @@
           <a:p>
             <a:pPr lvl="0"/>
             <a:r>
-              <a:rPr lang="de-DE" smtClean="0"/>
+              <a:rPr lang="de-DE"/>
               <a:t>Formatvorlagen des Textmasters bearbeiten</a:t>
             </a:r>
           </a:p>
           <a:p>
             <a:pPr lvl="1"/>
             <a:r>
-              <a:rPr lang="de-DE" smtClean="0"/>
+              <a:rPr lang="de-DE"/>
               <a:t>Zweite Ebene</a:t>
             </a:r>
           </a:p>
           <a:p>
             <a:pPr lvl="2"/>
             <a:r>
-              <a:rPr lang="de-DE" smtClean="0"/>
+              <a:rPr lang="de-DE"/>
               <a:t>Dritte Ebene</a:t>
             </a:r>
           </a:p>
           <a:p>
             <a:pPr lvl="3"/>
             <a:r>
-              <a:rPr lang="de-DE" smtClean="0"/>
+              <a:rPr lang="de-DE"/>
               <a:t>Vierte Ebene</a:t>
             </a:r>
           </a:p>
           <a:p>
             <a:pPr lvl="4"/>
             <a:r>
-              <a:rPr lang="de-DE" smtClean="0"/>
+              <a:rPr lang="de-DE"/>
               <a:t>Fünfte Ebene</a:t>
             </a:r>
             <a:endParaRPr lang="en-US" dirty="0"/>
@@ -1517,35 +1523,35 @@
           <a:p>
             <a:pPr lvl="0"/>
             <a:r>
-              <a:rPr lang="de-DE" smtClean="0"/>
+              <a:rPr lang="de-DE"/>
               <a:t>Formatvorlagen des Textmasters bearbeiten</a:t>
             </a:r>
           </a:p>
           <a:p>
             <a:pPr lvl="1"/>
             <a:r>
-              <a:rPr lang="de-DE" smtClean="0"/>
+              <a:rPr lang="de-DE"/>
               <a:t>Zweite Ebene</a:t>
             </a:r>
           </a:p>
           <a:p>
             <a:pPr lvl="2"/>
             <a:r>
-              <a:rPr lang="de-DE" smtClean="0"/>
+              <a:rPr lang="de-DE"/>
               <a:t>Dritte Ebene</a:t>
             </a:r>
           </a:p>
           <a:p>
             <a:pPr lvl="3"/>
             <a:r>
-              <a:rPr lang="de-DE" smtClean="0"/>
+              <a:rPr lang="de-DE"/>
               <a:t>Vierte Ebene</a:t>
             </a:r>
           </a:p>
           <a:p>
             <a:pPr lvl="4"/>
             <a:r>
-              <a:rPr lang="de-DE" smtClean="0"/>
+              <a:rPr lang="de-DE"/>
               <a:t>Fünfte Ebene</a:t>
             </a:r>
             <a:endParaRPr lang="en-US" dirty="0"/>
@@ -1569,7 +1575,7 @@
           <a:p>
             <a:fld id="{19AB4D41-86C1-4908-B66A-0B50CEB3BF29}" type="datetimeFigureOut">
               <a:rPr lang="en-US" dirty="0"/>
-              <a:t>1/18/2017</a:t>
+              <a:t>1/20/2017</a:t>
             </a:fld>
             <a:endParaRPr lang="en-US" dirty="0"/>
           </a:p>
@@ -1663,7 +1669,7 @@
           <a:lstStyle/>
           <a:p>
             <a:r>
-              <a:rPr lang="de-DE" smtClean="0"/>
+              <a:rPr lang="de-DE"/>
               <a:t>Titelmasterformat durch Klicken bearbeiten</a:t>
             </a:r>
             <a:endParaRPr lang="en-US" dirty="0"/>
@@ -1735,7 +1741,7 @@
           <a:p>
             <a:pPr lvl="0"/>
             <a:r>
-              <a:rPr lang="de-DE" smtClean="0"/>
+              <a:rPr lang="de-DE"/>
               <a:t>Formatvorlagen des Textmasters bearbeiten</a:t>
             </a:r>
           </a:p>
@@ -1763,35 +1769,35 @@
           <a:p>
             <a:pPr lvl="0"/>
             <a:r>
-              <a:rPr lang="de-DE" smtClean="0"/>
+              <a:rPr lang="de-DE"/>
               <a:t>Formatvorlagen des Textmasters bearbeiten</a:t>
             </a:r>
           </a:p>
           <a:p>
             <a:pPr lvl="1"/>
             <a:r>
-              <a:rPr lang="de-DE" smtClean="0"/>
+              <a:rPr lang="de-DE"/>
               <a:t>Zweite Ebene</a:t>
             </a:r>
           </a:p>
           <a:p>
             <a:pPr lvl="2"/>
             <a:r>
-              <a:rPr lang="de-DE" smtClean="0"/>
+              <a:rPr lang="de-DE"/>
               <a:t>Dritte Ebene</a:t>
             </a:r>
           </a:p>
           <a:p>
             <a:pPr lvl="3"/>
             <a:r>
-              <a:rPr lang="de-DE" smtClean="0"/>
+              <a:rPr lang="de-DE"/>
               <a:t>Vierte Ebene</a:t>
             </a:r>
           </a:p>
           <a:p>
             <a:pPr lvl="4"/>
             <a:r>
-              <a:rPr lang="de-DE" smtClean="0"/>
+              <a:rPr lang="de-DE"/>
               <a:t>Fünfte Ebene</a:t>
             </a:r>
             <a:endParaRPr lang="en-US" dirty="0"/>
@@ -1863,7 +1869,7 @@
           <a:p>
             <a:pPr lvl="0"/>
             <a:r>
-              <a:rPr lang="de-DE" smtClean="0"/>
+              <a:rPr lang="de-DE"/>
               <a:t>Formatvorlagen des Textmasters bearbeiten</a:t>
             </a:r>
           </a:p>
@@ -1891,35 +1897,35 @@
           <a:p>
             <a:pPr lvl="0"/>
             <a:r>
-              <a:rPr lang="de-DE" smtClean="0"/>
+              <a:rPr lang="de-DE"/>
               <a:t>Formatvorlagen des Textmasters bearbeiten</a:t>
             </a:r>
           </a:p>
           <a:p>
             <a:pPr lvl="1"/>
             <a:r>
-              <a:rPr lang="de-DE" smtClean="0"/>
+              <a:rPr lang="de-DE"/>
               <a:t>Zweite Ebene</a:t>
             </a:r>
           </a:p>
           <a:p>
             <a:pPr lvl="2"/>
             <a:r>
-              <a:rPr lang="de-DE" smtClean="0"/>
+              <a:rPr lang="de-DE"/>
               <a:t>Dritte Ebene</a:t>
             </a:r>
           </a:p>
           <a:p>
             <a:pPr lvl="3"/>
             <a:r>
-              <a:rPr lang="de-DE" smtClean="0"/>
+              <a:rPr lang="de-DE"/>
               <a:t>Vierte Ebene</a:t>
             </a:r>
           </a:p>
           <a:p>
             <a:pPr lvl="4"/>
             <a:r>
-              <a:rPr lang="de-DE" smtClean="0"/>
+              <a:rPr lang="de-DE"/>
               <a:t>Fünfte Ebene</a:t>
             </a:r>
             <a:endParaRPr lang="en-US" dirty="0"/>
@@ -1943,7 +1949,7 @@
           <a:p>
             <a:fld id="{E6426E2C-56C1-4E0D-A793-0088A7FDD37E}" type="datetimeFigureOut">
               <a:rPr lang="en-US" dirty="0"/>
-              <a:t>1/18/2017</a:t>
+              <a:t>1/20/2017</a:t>
             </a:fld>
             <a:endParaRPr lang="en-US" dirty="0"/>
           </a:p>
@@ -2032,7 +2038,7 @@
           <a:lstStyle/>
           <a:p>
             <a:r>
-              <a:rPr lang="de-DE" smtClean="0"/>
+              <a:rPr lang="de-DE"/>
               <a:t>Titelmasterformat durch Klicken bearbeiten</a:t>
             </a:r>
             <a:endParaRPr lang="en-US" dirty="0"/>
@@ -2056,7 +2062,7 @@
           <a:p>
             <a:fld id="{C8C39B41-D8B5-4052-B551-9B5525EAA8B6}" type="datetimeFigureOut">
               <a:rPr lang="en-US" dirty="0"/>
-              <a:t>1/18/2017</a:t>
+              <a:t>1/20/2017</a:t>
             </a:fld>
             <a:endParaRPr lang="en-US" dirty="0"/>
           </a:p>
@@ -2222,7 +2228,7 @@
           <a:p>
             <a:fld id="{4D94136C-8742-45B2-AF27-D93DF72833A9}" type="datetimeFigureOut">
               <a:rPr lang="en-US" dirty="0"/>
-              <a:t>1/18/2017</a:t>
+              <a:t>1/20/2017</a:t>
             </a:fld>
             <a:endParaRPr lang="en-US" dirty="0"/>
           </a:p>
@@ -2411,7 +2417,7 @@
           </a:lstStyle>
           <a:p>
             <a:r>
-              <a:rPr lang="de-DE" smtClean="0"/>
+              <a:rPr lang="de-DE"/>
               <a:t>Titelmasterformat durch Klicken bearbeiten</a:t>
             </a:r>
             <a:endParaRPr lang="en-US" dirty="0"/>
@@ -2440,35 +2446,35 @@
           <a:p>
             <a:pPr lvl="0"/>
             <a:r>
-              <a:rPr lang="de-DE" smtClean="0"/>
+              <a:rPr lang="de-DE"/>
               <a:t>Formatvorlagen des Textmasters bearbeiten</a:t>
             </a:r>
           </a:p>
           <a:p>
             <a:pPr lvl="1"/>
             <a:r>
-              <a:rPr lang="de-DE" smtClean="0"/>
+              <a:rPr lang="de-DE"/>
               <a:t>Zweite Ebene</a:t>
             </a:r>
           </a:p>
           <a:p>
             <a:pPr lvl="2"/>
             <a:r>
-              <a:rPr lang="de-DE" smtClean="0"/>
+              <a:rPr lang="de-DE"/>
               <a:t>Dritte Ebene</a:t>
             </a:r>
           </a:p>
           <a:p>
             <a:pPr lvl="3"/>
             <a:r>
-              <a:rPr lang="de-DE" smtClean="0"/>
+              <a:rPr lang="de-DE"/>
               <a:t>Vierte Ebene</a:t>
             </a:r>
           </a:p>
           <a:p>
             <a:pPr lvl="4"/>
             <a:r>
-              <a:rPr lang="de-DE" smtClean="0"/>
+              <a:rPr lang="de-DE"/>
               <a:t>Fünfte Ebene</a:t>
             </a:r>
             <a:endParaRPr lang="en-US" dirty="0"/>
@@ -2540,7 +2546,7 @@
           <a:p>
             <a:pPr lvl="0"/>
             <a:r>
-              <a:rPr lang="de-DE" smtClean="0"/>
+              <a:rPr lang="de-DE"/>
               <a:t>Formatvorlagen des Textmasters bearbeiten</a:t>
             </a:r>
           </a:p>
@@ -2572,7 +2578,7 @@
           <a:p>
             <a:fld id="{32ABBEA6-7C60-4B02-AE87-00D78D8422AF}" type="datetimeFigureOut">
               <a:rPr lang="en-US" dirty="0"/>
-              <a:t>1/18/2017</a:t>
+              <a:t>1/20/2017</a:t>
             </a:fld>
             <a:endParaRPr lang="en-US" dirty="0"/>
           </a:p>
@@ -2774,7 +2780,7 @@
           </a:lstStyle>
           <a:p>
             <a:r>
-              <a:rPr lang="de-DE" smtClean="0"/>
+              <a:rPr lang="de-DE"/>
               <a:t>Titelmasterformat durch Klicken bearbeiten</a:t>
             </a:r>
             <a:endParaRPr lang="en-US" dirty="0"/>
@@ -2849,7 +2855,7 @@
           </a:lstStyle>
           <a:p>
             <a:r>
-              <a:rPr lang="de-DE" smtClean="0"/>
+              <a:rPr lang="de-DE"/>
               <a:t>Bild durch Klicken auf Symbol hinzufügen</a:t>
             </a:r>
             <a:endParaRPr lang="en-US" dirty="0"/>
@@ -2927,7 +2933,7 @@
           <a:p>
             <a:pPr lvl="0"/>
             <a:r>
-              <a:rPr lang="de-DE" smtClean="0"/>
+              <a:rPr lang="de-DE"/>
               <a:t>Formatvorlagen des Textmasters bearbeiten</a:t>
             </a:r>
           </a:p>
@@ -2950,7 +2956,7 @@
           <a:p>
             <a:fld id="{C9CAD897-D46E-4AD2-BD9B-49DD3E640873}" type="datetimeFigureOut">
               <a:rPr lang="en-US" dirty="0"/>
-              <a:t>1/18/2017</a:t>
+              <a:t>1/20/2017</a:t>
             </a:fld>
             <a:endParaRPr lang="en-US" dirty="0"/>
           </a:p>
@@ -3130,7 +3136,7 @@
           <a:lstStyle/>
           <a:p>
             <a:r>
-              <a:rPr lang="de-DE" smtClean="0"/>
+              <a:rPr lang="de-DE"/>
               <a:t>Titelmasterformat durch Klicken bearbeiten</a:t>
             </a:r>
             <a:endParaRPr lang="en-US" dirty="0"/>
@@ -3164,35 +3170,35 @@
           <a:p>
             <a:pPr lvl="0"/>
             <a:r>
-              <a:rPr lang="de-DE" smtClean="0"/>
+              <a:rPr lang="de-DE"/>
               <a:t>Formatvorlagen des Textmasters bearbeiten</a:t>
             </a:r>
           </a:p>
           <a:p>
             <a:pPr lvl="1"/>
             <a:r>
-              <a:rPr lang="de-DE" smtClean="0"/>
+              <a:rPr lang="de-DE"/>
               <a:t>Zweite Ebene</a:t>
             </a:r>
           </a:p>
           <a:p>
             <a:pPr lvl="2"/>
             <a:r>
-              <a:rPr lang="de-DE" smtClean="0"/>
+              <a:rPr lang="de-DE"/>
               <a:t>Dritte Ebene</a:t>
             </a:r>
           </a:p>
           <a:p>
             <a:pPr lvl="3"/>
             <a:r>
-              <a:rPr lang="de-DE" smtClean="0"/>
+              <a:rPr lang="de-DE"/>
               <a:t>Vierte Ebene</a:t>
             </a:r>
           </a:p>
           <a:p>
             <a:pPr lvl="4"/>
             <a:r>
-              <a:rPr lang="de-DE" smtClean="0"/>
+              <a:rPr lang="de-DE"/>
               <a:t>Fünfte Ebene</a:t>
             </a:r>
             <a:endParaRPr lang="en-US" dirty="0"/>
@@ -3232,7 +3238,7 @@
           <a:p>
             <a:fld id="{98624D31-43A5-475A-80CF-332C9F6DCF35}" type="datetimeFigureOut">
               <a:rPr lang="en-US" dirty="0"/>
-              <a:t>1/18/2017</a:t>
+              <a:t>1/20/2017</a:t>
             </a:fld>
             <a:endParaRPr lang="en-US" dirty="0"/>
           </a:p>
@@ -3769,10 +3775,9 @@
           <a:lstStyle/>
           <a:p>
             <a:r>
-              <a:rPr lang="de-DE" dirty="0" smtClean="0"/>
+              <a:rPr lang="de-DE" dirty="0"/>
               <a:t>Übungsblatt 10  Aufgabe 1</a:t>
             </a:r>
-            <a:endParaRPr lang="de-DE" dirty="0"/>
           </a:p>
         </p:txBody>
       </p:sp>
@@ -3792,10 +3797,9 @@
           <a:lstStyle/>
           <a:p>
             <a:r>
-              <a:rPr lang="de-DE" dirty="0" smtClean="0"/>
+              <a:rPr lang="de-DE" dirty="0"/>
               <a:t>Gruppe 19</a:t>
             </a:r>
-            <a:endParaRPr lang="de-DE" dirty="0"/>
           </a:p>
         </p:txBody>
       </p:sp>
@@ -3845,15 +3849,14 @@
           <a:lstStyle/>
           <a:p>
             <a:r>
-              <a:rPr lang="de-DE" dirty="0" smtClean="0"/>
+              <a:rPr lang="de-DE" dirty="0"/>
               <a:t>Aufgabenstellung</a:t>
             </a:r>
-            <a:endParaRPr lang="de-DE" dirty="0"/>
           </a:p>
         </p:txBody>
       </p:sp>
-      <mc:AlternateContent xmlns:mc="http://schemas.openxmlformats.org/markup-compatibility/2006">
-        <mc:Choice xmlns:a14="http://schemas.microsoft.com/office/drawing/2010/main" Requires="a14">
+      <mc:AlternateContent xmlns:mc="http://schemas.openxmlformats.org/markup-compatibility/2006" xmlns:a14="http://schemas.microsoft.com/office/drawing/2010/main">
+        <mc:Choice Requires="a14">
           <p:sp>
             <p:nvSpPr>
               <p:cNvPr id="3" name="Inhaltsplatzhalter 2"/>
@@ -3872,36 +3875,15 @@
               <a:lstStyle/>
               <a:p>
                 <a:r>
-                  <a:rPr lang="de-DE" dirty="0" smtClean="0"/>
+                  <a:rPr lang="de-DE" dirty="0"/>
                   <a:t>Nehmen Sie an, ein neuer Berechnungsjob steht zur Verteilung. Drei Rechner A, B und C berechnen</a:t>
                 </a:r>
               </a:p>
               <a:p>
                 <a:r>
                   <a:rPr lang="de-DE" dirty="0"/>
-                  <a:t>die </a:t>
+                  <a:t>die geschätzte Transportzeit dieses Jobs in Minuten.</a:t>
                 </a:r>
-                <a:r>
-                  <a:rPr lang="de-DE" dirty="0" smtClean="0"/>
-                  <a:t>gesch</a:t>
-                </a:r>
-                <a:r>
-                  <a:rPr lang="de-DE" dirty="0"/>
-                  <a:t>ä</a:t>
-                </a:r>
-                <a:r>
-                  <a:rPr lang="de-DE" dirty="0" smtClean="0"/>
-                  <a:t>tzte </a:t>
-                </a:r>
-                <a:r>
-                  <a:rPr lang="de-DE" dirty="0"/>
-                  <a:t>Transportzeit dieses Jobs in </a:t>
-                </a:r>
-                <a:r>
-                  <a:rPr lang="de-DE" dirty="0" smtClean="0"/>
-                  <a:t>Minuten.</a:t>
-                </a:r>
-                <a:endParaRPr lang="de-DE" dirty="0"/>
               </a:p>
               <a:p>
                 <a:r>
@@ -3924,87 +3906,7 @@
               <a:p>
                 <a:r>
                   <a:rPr lang="de-DE" dirty="0"/>
-                  <a:t>Das System vereinbart eine </a:t>
-                </a:r>
-                <a:r>
-                  <a:rPr lang="de-DE" dirty="0" smtClean="0"/>
-                  <a:t>Entsch</a:t>
-                </a:r>
-                <a:r>
-                  <a:rPr lang="de-DE" dirty="0"/>
-                  <a:t>ä</a:t>
-                </a:r>
-                <a:r>
-                  <a:rPr lang="de-DE" dirty="0" smtClean="0"/>
-                  <a:t>digung </a:t>
-                </a:r>
-                <a:r>
-                  <a:rPr lang="de-DE" dirty="0"/>
-                  <a:t>von 3 </a:t>
-                </a:r>
-                <a:r>
-                  <a:rPr lang="de-DE" dirty="0" smtClean="0"/>
-                  <a:t>€ </a:t>
-                </a:r>
-                <a:r>
-                  <a:rPr lang="de-DE" dirty="0"/>
-                  <a:t>pro Minute und bittet die Rechner um </a:t>
-                </a:r>
-                <a:r>
-                  <a:rPr lang="de-DE" dirty="0" smtClean="0"/>
-                  <a:t>wahrheitsgemäße Einsch</a:t>
-                </a:r>
-                <a:r>
-                  <a:rPr lang="de-DE" dirty="0"/>
-                  <a:t>ä</a:t>
-                </a:r>
-                <a:r>
-                  <a:rPr lang="de-DE" dirty="0" smtClean="0"/>
-                  <a:t>tzung </a:t>
-                </a:r>
-                <a:r>
-                  <a:rPr lang="de-DE" dirty="0"/>
-                  <a:t>der Kosten, um den Job an den </a:t>
-                </a:r>
-                <a:r>
-                  <a:rPr lang="de-DE" dirty="0" smtClean="0"/>
-                  <a:t>g</a:t>
-                </a:r>
-                <a:r>
-                  <a:rPr lang="de-DE" dirty="0"/>
-                  <a:t>ü</a:t>
-                </a:r>
-                <a:r>
-                  <a:rPr lang="de-DE" dirty="0" smtClean="0"/>
-                  <a:t>nstigsten </a:t>
-                </a:r>
-                <a:r>
-                  <a:rPr lang="de-DE" dirty="0"/>
-                  <a:t>Rechner zu vergeben. </a:t>
-                </a:r>
-                <a:r>
-                  <a:rPr lang="de-DE" dirty="0" smtClean="0"/>
-                  <a:t>Einem Rechner </a:t>
-                </a:r>
-                <a:r>
-                  <a:rPr lang="de-DE" dirty="0"/>
-                  <a:t>entstehen auch </a:t>
-                </a:r>
-                <a:r>
-                  <a:rPr lang="de-DE" dirty="0" smtClean="0"/>
-                  <a:t>tats</a:t>
-                </a:r>
-                <a:r>
-                  <a:rPr lang="de-DE" dirty="0"/>
-                  <a:t>ä</a:t>
-                </a:r>
-                <a:r>
-                  <a:rPr lang="de-DE" dirty="0" smtClean="0"/>
-                  <a:t>chliche </a:t>
-                </a:r>
-                <a:r>
-                  <a:rPr lang="de-DE" dirty="0"/>
-                  <a:t>Kosten, weshalb der Nutzen </a:t>
+                  <a:t>Das System vereinbart eine Entschädigung von 3 € pro Minute und bittet die Rechner um wahrheitsgemäße Einschätzung der Kosten, um den Job an den günstigsten Rechner zu vergeben. Einem Rechner entstehen auch tatsächliche Kosten, weshalb der Nutzen </a:t>
                 </a:r>
                 <a14:m>
                   <m:oMath xmlns:m="http://schemas.openxmlformats.org/officeDocument/2006/math">
@@ -4042,27 +3944,14 @@
                   </m:oMath>
                 </a14:m>
                 <a:r>
-                  <a:rPr lang="de-DE" dirty="0" smtClean="0"/>
-                  <a:t> </a:t>
+                  <a:rPr lang="de-DE" dirty="0"/>
+                  <a:t> ist, wenn i ausgewählt wird.</a:t>
                 </a:r>
-                <a:r>
-                  <a:rPr lang="de-DE" dirty="0"/>
-                  <a:t>ist, wenn i </a:t>
-                </a:r>
-                <a:r>
-                  <a:rPr lang="de-DE" dirty="0" smtClean="0"/>
-                  <a:t>ausgewählt wird</a:t>
-                </a:r>
-                <a:r>
-                  <a:rPr lang="de-DE" dirty="0"/>
-                  <a:t>.</a:t>
-                </a:r>
-                <a:endParaRPr lang="de-DE" dirty="0"/>
               </a:p>
             </p:txBody>
           </p:sp>
         </mc:Choice>
-        <mc:Fallback>
+        <mc:Fallback xmlns="">
           <p:sp>
             <p:nvSpPr>
               <p:cNvPr id="3" name="Inhaltsplatzhalter 2"/>
@@ -4142,15 +4031,14 @@
           <a:lstStyle/>
           <a:p>
             <a:r>
-              <a:rPr lang="de-DE" dirty="0" smtClean="0"/>
-              <a:t>Aufgabe a</a:t>
+              <a:rPr lang="de-DE" dirty="0"/>
+              <a:t>Aufgabe 1a</a:t>
             </a:r>
-            <a:endParaRPr lang="de-DE" dirty="0"/>
           </a:p>
         </p:txBody>
       </p:sp>
-      <mc:AlternateContent xmlns:mc="http://schemas.openxmlformats.org/markup-compatibility/2006">
-        <mc:Choice xmlns:a14="http://schemas.microsoft.com/office/drawing/2010/main" Requires="a14">
+      <mc:AlternateContent xmlns:mc="http://schemas.openxmlformats.org/markup-compatibility/2006" xmlns:a14="http://schemas.microsoft.com/office/drawing/2010/main">
+        <mc:Choice Requires="a14">
           <p:sp>
             <p:nvSpPr>
               <p:cNvPr id="3" name="Inhaltsplatzhalter 2"/>
@@ -4167,7 +4055,7 @@
               <a:lstStyle/>
               <a:p>
                 <a:r>
-                  <a:rPr lang="de-DE" dirty="0" smtClean="0"/>
+                  <a:rPr lang="de-DE" dirty="0"/>
                   <a:t>Definieren Sie die Auswahlmenge X und die wahren Bewertungen </a:t>
                 </a:r>
                 <a14:m>
@@ -4200,7 +4088,7 @@
                   </m:oMath>
                 </a14:m>
                 <a:r>
-                  <a:rPr lang="de-DE" dirty="0" smtClean="0"/>
+                  <a:rPr lang="de-DE" dirty="0"/>
                   <a:t> für </a:t>
                 </a:r>
                 <a14:m>
@@ -4276,21 +4164,89 @@
                     </m:r>
                   </m:oMath>
                 </a14:m>
-                <a:endParaRPr lang="de-DE" dirty="0" smtClean="0"/>
+                <a:endParaRPr lang="de-DE" dirty="0"/>
+              </a:p>
+              <a:p>
+                <a:endParaRPr lang="de-DE" dirty="0"/>
               </a:p>
               <a:p>
                 <a:r>
-                  <a:rPr lang="de-DE" dirty="0" smtClean="0"/>
+                  <a:rPr lang="de-DE" dirty="0"/>
                   <a:t>X = {A,B,C}</a:t>
                 </a:r>
               </a:p>
               <a:p>
-                <a:r>
-                  <a:rPr lang="de-DE" dirty="0" smtClean="0"/>
-                  <a:t>Rechenweg:  -3€ * Anzahl Minuten</a:t>
-                </a:r>
+                <a:endParaRPr lang="de-DE" dirty="0"/>
               </a:p>
               <a:p>
+                <a14:m>
+                  <m:oMath xmlns:m="http://schemas.openxmlformats.org/officeDocument/2006/math">
+                    <m:sSub>
+                      <m:sSubPr>
+                        <m:ctrlPr>
+                          <a:rPr lang="de-DE" i="1">
+                            <a:latin typeface="Cambria Math" panose="02040503050406030204" pitchFamily="18" charset="0"/>
+                          </a:rPr>
+                        </m:ctrlPr>
+                      </m:sSubPr>
+                      <m:e>
+                        <m:r>
+                          <a:rPr lang="de-DE" i="1">
+                            <a:latin typeface="Cambria Math" panose="02040503050406030204" pitchFamily="18" charset="0"/>
+                          </a:rPr>
+                          <m:t>𝑣</m:t>
+                        </m:r>
+                      </m:e>
+                      <m:sub>
+                        <m:r>
+                          <a:rPr lang="de-DE" i="1">
+                            <a:latin typeface="Cambria Math" panose="02040503050406030204" pitchFamily="18" charset="0"/>
+                          </a:rPr>
+                          <m:t>𝐴</m:t>
+                        </m:r>
+                      </m:sub>
+                    </m:sSub>
+                    <m:d>
+                      <m:dPr>
+                        <m:ctrlPr>
+                          <a:rPr lang="de-DE" i="1">
+                            <a:latin typeface="Cambria Math" panose="02040503050406030204" pitchFamily="18" charset="0"/>
+                          </a:rPr>
+                        </m:ctrlPr>
+                      </m:dPr>
+                      <m:e>
+                        <m:r>
+                          <a:rPr lang="de-DE" i="1">
+                            <a:latin typeface="Cambria Math" panose="02040503050406030204" pitchFamily="18" charset="0"/>
+                          </a:rPr>
+                          <m:t>𝐴</m:t>
+                        </m:r>
+                      </m:e>
+                    </m:d>
+                    <m:r>
+                      <a:rPr lang="de-DE" i="1">
+                        <a:latin typeface="Cambria Math" panose="02040503050406030204" pitchFamily="18" charset="0"/>
+                      </a:rPr>
+                      <m:t>=</m:t>
+                    </m:r>
+                    <m:r>
+                      <a:rPr lang="de-DE" b="0" i="1" smtClean="0">
+                        <a:latin typeface="Cambria Math" panose="02040503050406030204" pitchFamily="18" charset="0"/>
+                      </a:rPr>
+                      <m:t>−3∗5=</m:t>
+                    </m:r>
+                    <m:r>
+                      <a:rPr lang="de-DE" i="1">
+                        <a:latin typeface="Cambria Math" panose="02040503050406030204" pitchFamily="18" charset="0"/>
+                      </a:rPr>
+                      <m:t>−15</m:t>
+                    </m:r>
+                  </m:oMath>
+                </a14:m>
+                <a:r>
+                  <a:rPr lang="de-DE" dirty="0"/>
+                  <a:t> 	</a:t>
+                </a:r>
                 <a14:m>
                   <m:oMath xmlns:m="http://schemas.openxmlformats.org/officeDocument/2006/math">
                     <m:sSub>
@@ -4322,7 +4278,82 @@
                       <a:rPr lang="de-DE" i="1">
                         <a:latin typeface="Cambria Math" panose="02040503050406030204" pitchFamily="18" charset="0"/>
                       </a:rPr>
-                      <m:t>=−15</m:t>
+                      <m:t>(</m:t>
+                    </m:r>
+                    <m:r>
+                      <a:rPr lang="de-DE" b="0" i="1" smtClean="0">
+                        <a:latin typeface="Cambria Math" panose="02040503050406030204" pitchFamily="18" charset="0"/>
+                      </a:rPr>
+                      <m:t>𝐵</m:t>
+                    </m:r>
+                    <m:r>
+                      <a:rPr lang="de-DE" i="1">
+                        <a:latin typeface="Cambria Math" panose="02040503050406030204" pitchFamily="18" charset="0"/>
+                      </a:rPr>
+                      <m:t>)=</m:t>
+                    </m:r>
+                    <m:r>
+                      <a:rPr lang="de-DE" b="0" i="1" smtClean="0">
+                        <a:latin typeface="Cambria Math" panose="02040503050406030204" pitchFamily="18" charset="0"/>
+                      </a:rPr>
+                      <m:t>0</m:t>
+                    </m:r>
+                  </m:oMath>
+                </a14:m>
+                <a:r>
+                  <a:rPr lang="de-DE" dirty="0"/>
+                  <a:t>		</a:t>
+                </a:r>
+                <a14:m>
+                  <m:oMath xmlns:m="http://schemas.openxmlformats.org/officeDocument/2006/math">
+                    <m:sSub>
+                      <m:sSubPr>
+                        <m:ctrlPr>
+                          <a:rPr lang="de-DE" i="1">
+                            <a:latin typeface="Cambria Math" panose="02040503050406030204" pitchFamily="18" charset="0"/>
+                          </a:rPr>
+                        </m:ctrlPr>
+                      </m:sSubPr>
+                      <m:e>
+                        <m:r>
+                          <a:rPr lang="de-DE" i="1">
+                            <a:latin typeface="Cambria Math" panose="02040503050406030204" pitchFamily="18" charset="0"/>
+                          </a:rPr>
+                          <m:t>𝑣</m:t>
+                        </m:r>
+                      </m:e>
+                      <m:sub>
+                        <m:r>
+                          <a:rPr lang="de-DE" i="1">
+                            <a:latin typeface="Cambria Math" panose="02040503050406030204" pitchFamily="18" charset="0"/>
+                          </a:rPr>
+                          <m:t>𝐴</m:t>
+                        </m:r>
+                      </m:sub>
+                    </m:sSub>
+                    <m:r>
+                      <a:rPr lang="de-DE" i="1">
+                        <a:latin typeface="Cambria Math" panose="02040503050406030204" pitchFamily="18" charset="0"/>
+                      </a:rPr>
+                      <m:t>(</m:t>
+                    </m:r>
+                    <m:r>
+                      <a:rPr lang="de-DE" b="0" i="1" smtClean="0">
+                        <a:latin typeface="Cambria Math" panose="02040503050406030204" pitchFamily="18" charset="0"/>
+                      </a:rPr>
+                      <m:t>𝐶</m:t>
+                    </m:r>
+                    <m:r>
+                      <a:rPr lang="de-DE" i="1">
+                        <a:latin typeface="Cambria Math" panose="02040503050406030204" pitchFamily="18" charset="0"/>
+                      </a:rPr>
+                      <m:t>)=</m:t>
+                    </m:r>
+                    <m:r>
+                      <a:rPr lang="de-DE" b="0" i="1" smtClean="0">
+                        <a:latin typeface="Cambria Math" panose="02040503050406030204" pitchFamily="18" charset="0"/>
+                      </a:rPr>
+                      <m:t>0</m:t>
                     </m:r>
                   </m:oMath>
                 </a14:m>
@@ -4349,7 +4380,7 @@
                       </m:e>
                       <m:sub>
                         <m:r>
-                          <a:rPr lang="de-DE" b="0" i="1" smtClean="0">
+                          <a:rPr lang="de-DE" i="1">
                             <a:latin typeface="Cambria Math" panose="02040503050406030204" pitchFamily="18" charset="0"/>
                           </a:rPr>
                           <m:t>𝐵</m:t>
@@ -4360,13 +4391,150 @@
                       <a:rPr lang="de-DE" i="1">
                         <a:latin typeface="Cambria Math" panose="02040503050406030204" pitchFamily="18" charset="0"/>
                       </a:rPr>
-                      <m:t>=−</m:t>
+                      <m:t>(</m:t>
                     </m:r>
                     <m:r>
                       <a:rPr lang="de-DE" b="0" i="1" smtClean="0">
                         <a:latin typeface="Cambria Math" panose="02040503050406030204" pitchFamily="18" charset="0"/>
                       </a:rPr>
-                      <m:t>21</m:t>
+                      <m:t>𝐴</m:t>
+                    </m:r>
+                    <m:r>
+                      <a:rPr lang="de-DE" i="1">
+                        <a:latin typeface="Cambria Math" panose="02040503050406030204" pitchFamily="18" charset="0"/>
+                      </a:rPr>
+                      <m:t>)=</m:t>
+                    </m:r>
+                    <m:r>
+                      <a:rPr lang="de-DE" b="0" i="1" smtClean="0">
+                        <a:latin typeface="Cambria Math" panose="02040503050406030204" pitchFamily="18" charset="0"/>
+                      </a:rPr>
+                      <m:t>0</m:t>
+                    </m:r>
+                  </m:oMath>
+                </a14:m>
+                <a:r>
+                  <a:rPr lang="de-DE" dirty="0"/>
+                  <a:t> 		</a:t>
+                </a:r>
+                <a14:m>
+                  <m:oMath xmlns:m="http://schemas.openxmlformats.org/officeDocument/2006/math">
+                    <m:sSub>
+                      <m:sSubPr>
+                        <m:ctrlPr>
+                          <a:rPr lang="de-DE" i="1">
+                            <a:latin typeface="Cambria Math" panose="02040503050406030204" pitchFamily="18" charset="0"/>
+                          </a:rPr>
+                        </m:ctrlPr>
+                      </m:sSubPr>
+                      <m:e>
+                        <m:r>
+                          <a:rPr lang="de-DE" i="1">
+                            <a:latin typeface="Cambria Math" panose="02040503050406030204" pitchFamily="18" charset="0"/>
+                          </a:rPr>
+                          <m:t>𝑣</m:t>
+                        </m:r>
+                      </m:e>
+                      <m:sub>
+                        <m:r>
+                          <a:rPr lang="de-DE" i="1">
+                            <a:latin typeface="Cambria Math" panose="02040503050406030204" pitchFamily="18" charset="0"/>
+                          </a:rPr>
+                          <m:t>𝐵</m:t>
+                        </m:r>
+                      </m:sub>
+                    </m:sSub>
+                    <m:d>
+                      <m:dPr>
+                        <m:ctrlPr>
+                          <a:rPr lang="de-DE" i="1">
+                            <a:latin typeface="Cambria Math" panose="02040503050406030204" pitchFamily="18" charset="0"/>
+                          </a:rPr>
+                        </m:ctrlPr>
+                      </m:dPr>
+                      <m:e>
+                        <m:r>
+                          <a:rPr lang="de-DE" i="1">
+                            <a:latin typeface="Cambria Math" panose="02040503050406030204" pitchFamily="18" charset="0"/>
+                          </a:rPr>
+                          <m:t>𝐵</m:t>
+                        </m:r>
+                      </m:e>
+                    </m:d>
+                    <m:r>
+                      <a:rPr lang="de-DE" i="1">
+                        <a:latin typeface="Cambria Math" panose="02040503050406030204" pitchFamily="18" charset="0"/>
+                      </a:rPr>
+                      <m:t>=</m:t>
+                    </m:r>
+                    <m:r>
+                      <a:rPr lang="de-DE" b="0" i="1" smtClean="0">
+                        <a:latin typeface="Cambria Math" panose="02040503050406030204" pitchFamily="18" charset="0"/>
+                      </a:rPr>
+                      <m:t>−3∗7=</m:t>
+                    </m:r>
+                    <m:r>
+                      <a:rPr lang="de-DE" i="1">
+                        <a:latin typeface="Cambria Math" panose="02040503050406030204" pitchFamily="18" charset="0"/>
+                      </a:rPr>
+                      <m:t>−21</m:t>
+                    </m:r>
+                  </m:oMath>
+                </a14:m>
+                <a:r>
+                  <a:rPr lang="de-DE" dirty="0"/>
+                  <a:t>	</a:t>
+                </a:r>
+                <a14:m>
+                  <m:oMath xmlns:m="http://schemas.openxmlformats.org/officeDocument/2006/math">
+                    <m:sSub>
+                      <m:sSubPr>
+                        <m:ctrlPr>
+                          <a:rPr lang="de-DE" i="1">
+                            <a:latin typeface="Cambria Math" panose="02040503050406030204" pitchFamily="18" charset="0"/>
+                          </a:rPr>
+                        </m:ctrlPr>
+                      </m:sSubPr>
+                      <m:e>
+                        <m:r>
+                          <a:rPr lang="de-DE" i="1">
+                            <a:latin typeface="Cambria Math" panose="02040503050406030204" pitchFamily="18" charset="0"/>
+                          </a:rPr>
+                          <m:t>𝑣</m:t>
+                        </m:r>
+                      </m:e>
+                      <m:sub>
+                        <m:r>
+                          <a:rPr lang="de-DE" i="1">
+                            <a:latin typeface="Cambria Math" panose="02040503050406030204" pitchFamily="18" charset="0"/>
+                          </a:rPr>
+                          <m:t>𝐵</m:t>
+                        </m:r>
+                      </m:sub>
+                    </m:sSub>
+                    <m:r>
+                      <a:rPr lang="de-DE" i="1">
+                        <a:latin typeface="Cambria Math" panose="02040503050406030204" pitchFamily="18" charset="0"/>
+                      </a:rPr>
+                      <m:t>(</m:t>
+                    </m:r>
+                    <m:r>
+                      <a:rPr lang="de-DE" b="0" i="1" smtClean="0">
+                        <a:latin typeface="Cambria Math" panose="02040503050406030204" pitchFamily="18" charset="0"/>
+                      </a:rPr>
+                      <m:t>𝐶</m:t>
+                    </m:r>
+                    <m:r>
+                      <a:rPr lang="de-DE" i="1">
+                        <a:latin typeface="Cambria Math" panose="02040503050406030204" pitchFamily="18" charset="0"/>
+                      </a:rPr>
+                      <m:t>)=</m:t>
+                    </m:r>
+                    <m:r>
+                      <a:rPr lang="de-DE" b="0" i="1" smtClean="0">
+                        <a:latin typeface="Cambria Math" panose="02040503050406030204" pitchFamily="18" charset="0"/>
+                      </a:rPr>
+                      <m:t>0</m:t>
                     </m:r>
                   </m:oMath>
                 </a14:m>
@@ -4393,7 +4561,7 @@
                       </m:e>
                       <m:sub>
                         <m:r>
-                          <a:rPr lang="de-DE" b="0" i="1" smtClean="0">
+                          <a:rPr lang="de-DE" i="1">
                             <a:latin typeface="Cambria Math" panose="02040503050406030204" pitchFamily="18" charset="0"/>
                           </a:rPr>
                           <m:t>𝐶</m:t>
@@ -4404,20 +4572,154 @@
                       <a:rPr lang="de-DE" i="1">
                         <a:latin typeface="Cambria Math" panose="02040503050406030204" pitchFamily="18" charset="0"/>
                       </a:rPr>
-                      <m:t>=−</m:t>
+                      <m:t>(</m:t>
                     </m:r>
                     <m:r>
                       <a:rPr lang="de-DE" b="0" i="1" smtClean="0">
                         <a:latin typeface="Cambria Math" panose="02040503050406030204" pitchFamily="18" charset="0"/>
                       </a:rPr>
-                      <m:t>36</m:t>
+                      <m:t>𝐴</m:t>
+                    </m:r>
+                    <m:r>
+                      <a:rPr lang="de-DE" i="1">
+                        <a:latin typeface="Cambria Math" panose="02040503050406030204" pitchFamily="18" charset="0"/>
+                      </a:rPr>
+                      <m:t>)=</m:t>
+                    </m:r>
+                    <m:r>
+                      <a:rPr lang="de-DE" b="0" i="1" smtClean="0">
+                        <a:latin typeface="Cambria Math" panose="02040503050406030204" pitchFamily="18" charset="0"/>
+                      </a:rPr>
+                      <m:t>0</m:t>
+                    </m:r>
+                  </m:oMath>
+                </a14:m>
+                <a:r>
+                  <a:rPr lang="de-DE" dirty="0"/>
+                  <a:t>		</a:t>
+                </a:r>
+                <a14:m>
+                  <m:oMath xmlns:m="http://schemas.openxmlformats.org/officeDocument/2006/math">
+                    <m:sSub>
+                      <m:sSubPr>
+                        <m:ctrlPr>
+                          <a:rPr lang="de-DE" i="1">
+                            <a:latin typeface="Cambria Math" panose="02040503050406030204" pitchFamily="18" charset="0"/>
+                          </a:rPr>
+                        </m:ctrlPr>
+                      </m:sSubPr>
+                      <m:e>
+                        <m:r>
+                          <a:rPr lang="de-DE" i="1">
+                            <a:latin typeface="Cambria Math" panose="02040503050406030204" pitchFamily="18" charset="0"/>
+                          </a:rPr>
+                          <m:t>𝑣</m:t>
+                        </m:r>
+                      </m:e>
+                      <m:sub>
+                        <m:r>
+                          <a:rPr lang="de-DE" i="1">
+                            <a:latin typeface="Cambria Math" panose="02040503050406030204" pitchFamily="18" charset="0"/>
+                          </a:rPr>
+                          <m:t>𝐶</m:t>
+                        </m:r>
+                      </m:sub>
+                    </m:sSub>
+                    <m:r>
+                      <a:rPr lang="de-DE" i="1">
+                        <a:latin typeface="Cambria Math" panose="02040503050406030204" pitchFamily="18" charset="0"/>
+                      </a:rPr>
+                      <m:t>(</m:t>
+                    </m:r>
+                    <m:r>
+                      <a:rPr lang="de-DE" b="0" i="1" smtClean="0">
+                        <a:latin typeface="Cambria Math" panose="02040503050406030204" pitchFamily="18" charset="0"/>
+                      </a:rPr>
+                      <m:t>𝐵</m:t>
+                    </m:r>
+                    <m:r>
+                      <a:rPr lang="de-DE" i="1">
+                        <a:latin typeface="Cambria Math" panose="02040503050406030204" pitchFamily="18" charset="0"/>
+                      </a:rPr>
+                      <m:t>)=</m:t>
+                    </m:r>
+                    <m:r>
+                      <a:rPr lang="de-DE" b="0" i="1" smtClean="0">
+                        <a:latin typeface="Cambria Math" panose="02040503050406030204" pitchFamily="18" charset="0"/>
+                      </a:rPr>
+                      <m:t>0</m:t>
+                    </m:r>
+                  </m:oMath>
+                </a14:m>
+                <a:r>
+                  <a:rPr lang="de-DE" dirty="0"/>
+                  <a:t>		</a:t>
+                </a:r>
+                <a14:m>
+                  <m:oMath xmlns:m="http://schemas.openxmlformats.org/officeDocument/2006/math">
+                    <m:sSub>
+                      <m:sSubPr>
+                        <m:ctrlPr>
+                          <a:rPr lang="de-DE" i="1">
+                            <a:latin typeface="Cambria Math" panose="02040503050406030204" pitchFamily="18" charset="0"/>
+                          </a:rPr>
+                        </m:ctrlPr>
+                      </m:sSubPr>
+                      <m:e>
+                        <m:r>
+                          <a:rPr lang="de-DE" i="1">
+                            <a:latin typeface="Cambria Math" panose="02040503050406030204" pitchFamily="18" charset="0"/>
+                          </a:rPr>
+                          <m:t>𝑣</m:t>
+                        </m:r>
+                      </m:e>
+                      <m:sub>
+                        <m:r>
+                          <a:rPr lang="de-DE" i="1">
+                            <a:latin typeface="Cambria Math" panose="02040503050406030204" pitchFamily="18" charset="0"/>
+                          </a:rPr>
+                          <m:t>𝐶</m:t>
+                        </m:r>
+                      </m:sub>
+                    </m:sSub>
+                    <m:d>
+                      <m:dPr>
+                        <m:ctrlPr>
+                          <a:rPr lang="de-DE" i="1">
+                            <a:latin typeface="Cambria Math" panose="02040503050406030204" pitchFamily="18" charset="0"/>
+                          </a:rPr>
+                        </m:ctrlPr>
+                      </m:dPr>
+                      <m:e>
+                        <m:r>
+                          <a:rPr lang="de-DE" i="1">
+                            <a:latin typeface="Cambria Math" panose="02040503050406030204" pitchFamily="18" charset="0"/>
+                          </a:rPr>
+                          <m:t>𝐶</m:t>
+                        </m:r>
+                      </m:e>
+                    </m:d>
+                    <m:r>
+                      <a:rPr lang="de-DE" i="1">
+                        <a:latin typeface="Cambria Math" panose="02040503050406030204" pitchFamily="18" charset="0"/>
+                      </a:rPr>
+                      <m:t>=</m:t>
+                    </m:r>
+                    <m:r>
+                      <a:rPr lang="de-DE" b="0" i="1" smtClean="0">
+                        <a:latin typeface="Cambria Math" panose="02040503050406030204" pitchFamily="18" charset="0"/>
+                      </a:rPr>
+                      <m:t>−3∗12=</m:t>
+                    </m:r>
+                    <m:r>
+                      <a:rPr lang="de-DE" i="1">
+                        <a:latin typeface="Cambria Math" panose="02040503050406030204" pitchFamily="18" charset="0"/>
+                      </a:rPr>
+                      <m:t>−36</m:t>
                     </m:r>
                   </m:oMath>
                 </a14:m>
                 <a:endParaRPr lang="de-DE" dirty="0"/>
-              </a:p>
-              <a:p>
-                <a:endParaRPr lang="de-DE" dirty="0" smtClean="0"/>
               </a:p>
               <a:p>
                 <a:endParaRPr lang="de-DE" dirty="0"/>
@@ -4425,7 +4727,7 @@
             </p:txBody>
           </p:sp>
         </mc:Choice>
-        <mc:Fallback>
+        <mc:Fallback xmlns="">
           <p:sp>
             <p:nvSpPr>
               <p:cNvPr id="3" name="Inhaltsplatzhalter 2"/>
@@ -4440,7 +4742,7 @@
               <a:blipFill>
                 <a:blip r:embed="rId2"/>
                 <a:stretch>
-                  <a:fillRect l="-606" t="-1667"/>
+                  <a:fillRect l="-1515" t="-1667"/>
                 </a:stretch>
               </a:blipFill>
             </p:spPr>
@@ -4505,15 +4807,14 @@
           <a:lstStyle/>
           <a:p>
             <a:r>
-              <a:rPr lang="de-DE" dirty="0" smtClean="0"/>
-              <a:t>Aufgabe b</a:t>
+              <a:rPr lang="de-DE" dirty="0"/>
+              <a:t>Aufgabe 1b</a:t>
             </a:r>
-            <a:endParaRPr lang="de-DE" dirty="0"/>
           </a:p>
         </p:txBody>
       </p:sp>
-      <mc:AlternateContent xmlns:mc="http://schemas.openxmlformats.org/markup-compatibility/2006">
-        <mc:Choice xmlns:a14="http://schemas.microsoft.com/office/drawing/2010/main" Requires="a14">
+      <mc:AlternateContent xmlns:mc="http://schemas.openxmlformats.org/markup-compatibility/2006" xmlns:a14="http://schemas.microsoft.com/office/drawing/2010/main">
+        <mc:Choice Requires="a14">
           <p:sp>
             <p:nvSpPr>
               <p:cNvPr id="3" name="Inhaltsplatzhalter 2"/>
@@ -4535,20 +4836,8 @@
               <a:lstStyle/>
               <a:p>
                 <a:r>
-                  <a:rPr lang="de-DE" dirty="0" smtClean="0"/>
-                  <a:t>Wenden Sie VCG f</a:t>
-                </a:r>
-                <a:r>
                   <a:rPr lang="de-DE" dirty="0"/>
-                  <a:t>ü</a:t>
-                </a:r>
-                <a:r>
-                  <a:rPr lang="de-DE" dirty="0" smtClean="0"/>
-                  <a:t>r </a:t>
-                </a:r>
-                <a:r>
-                  <a:rPr lang="de-DE" dirty="0"/>
-                  <a:t>die dominante Strategie </a:t>
+                  <a:t>Wenden Sie VCG für die dominante Strategie </a:t>
                 </a:r>
                 <a14:m>
                   <m:oMath xmlns:m="http://schemas.openxmlformats.org/officeDocument/2006/math">
@@ -4623,40 +4912,8 @@
                   </m:oMath>
                 </a14:m>
                 <a:r>
-                  <a:rPr lang="de-DE" dirty="0" smtClean="0"/>
-                  <a:t> für </a:t>
-                </a:r>
-                <a:r>
                   <a:rPr lang="de-DE" dirty="0"/>
-                  <a:t>alle Agenten an; welche </a:t>
-                </a:r>
-                <a:r>
-                  <a:rPr lang="de-DE" dirty="0" smtClean="0"/>
-                  <a:t>Entscheidung wird getroffen </a:t>
-                </a:r>
-                <a:r>
-                  <a:rPr lang="de-DE" dirty="0"/>
-                  <a:t>und welche Bezahlungen ergeben sich daraus </a:t>
-                </a:r>
-                <a:r>
-                  <a:rPr lang="de-DE" dirty="0" smtClean="0"/>
-                  <a:t>f</a:t>
-                </a:r>
-                <a:r>
-                  <a:rPr lang="de-DE" dirty="0"/>
-                  <a:t>ü</a:t>
-                </a:r>
-                <a:r>
-                  <a:rPr lang="de-DE" dirty="0" smtClean="0"/>
-                  <a:t>r </a:t>
-                </a:r>
-                <a:r>
-                  <a:rPr lang="de-DE" dirty="0"/>
-                  <a:t>die Agenten</a:t>
-                </a:r>
-                <a:r>
-                  <a:rPr lang="de-DE" dirty="0" smtClean="0"/>
-                  <a:t>?</a:t>
+                  <a:t> für alle Agenten an; welche Entscheidung wird getroffen und welche Bezahlungen ergeben sich daraus für die Agenten?</a:t>
                 </a:r>
               </a:p>
               <a:p>
@@ -4665,7 +4922,7 @@
             </p:txBody>
           </p:sp>
         </mc:Choice>
-        <mc:Fallback>
+        <mc:Fallback xmlns="">
           <p:sp>
             <p:nvSpPr>
               <p:cNvPr id="3" name="Inhaltsplatzhalter 2"/>
@@ -4703,24 +4960,485 @@
           </p:sp>
         </mc:Fallback>
       </mc:AlternateContent>
-      <mc:AlternateContent xmlns:mc="http://schemas.openxmlformats.org/markup-compatibility/2006">
-        <mc:Choice xmlns:a14="http://schemas.microsoft.com/office/drawing/2010/main" Requires="a14">
+      <p:pic>
+        <p:nvPicPr>
+          <p:cNvPr id="5" name="Grafik 4"/>
+          <p:cNvPicPr>
+            <a:picLocks noChangeAspect="1"/>
+          </p:cNvPicPr>
+          <p:nvPr/>
+        </p:nvPicPr>
+        <p:blipFill>
+          <a:blip r:embed="rId3"/>
+          <a:stretch>
+            <a:fillRect/>
+          </a:stretch>
+        </p:blipFill>
+        <p:spPr>
+          <a:xfrm>
+            <a:off x="1897380" y="2833226"/>
+            <a:ext cx="8458200" cy="2314575"/>
+          </a:xfrm>
+          <a:prstGeom prst="rect">
+            <a:avLst/>
+          </a:prstGeom>
+        </p:spPr>
+      </p:pic>
+    </p:spTree>
+    <p:extLst>
+      <p:ext uri="{BB962C8B-B14F-4D97-AF65-F5344CB8AC3E}">
+        <p14:creationId xmlns:p14="http://schemas.microsoft.com/office/powerpoint/2010/main" val="3677205065"/>
+      </p:ext>
+    </p:extLst>
+  </p:cSld>
+  <p:clrMapOvr>
+    <a:masterClrMapping/>
+  </p:clrMapOvr>
+</p:sld>
+</file>
+
+<file path=ppt/slides/slide5.xml><?xml version="1.0" encoding="utf-8"?>
+<p:sld xmlns:a="http://schemas.openxmlformats.org/drawingml/2006/main" xmlns:r="http://schemas.openxmlformats.org/officeDocument/2006/relationships" xmlns:p="http://schemas.openxmlformats.org/presentationml/2006/main">
+  <p:cSld>
+    <p:spTree>
+      <p:nvGrpSpPr>
+        <p:cNvPr id="1" name=""/>
+        <p:cNvGrpSpPr/>
+        <p:nvPr/>
+      </p:nvGrpSpPr>
+      <p:grpSpPr>
+        <a:xfrm>
+          <a:off x="0" y="0"/>
+          <a:ext cx="0" cy="0"/>
+          <a:chOff x="0" y="0"/>
+          <a:chExt cx="0" cy="0"/>
+        </a:xfrm>
+      </p:grpSpPr>
+      <p:sp>
+        <p:nvSpPr>
+          <p:cNvPr id="2" name="Titel 1"/>
+          <p:cNvSpPr>
+            <a:spLocks noGrp="1"/>
+          </p:cNvSpPr>
+          <p:nvPr>
+            <p:ph type="title"/>
+          </p:nvPr>
+        </p:nvSpPr>
+        <p:spPr/>
+        <p:txBody>
+          <a:bodyPr/>
+          <a:lstStyle/>
+          <a:p>
+            <a:r>
+              <a:rPr lang="de-DE" dirty="0"/>
+              <a:t>Aufgabe 1b</a:t>
+            </a:r>
+          </a:p>
+        </p:txBody>
+      </p:sp>
+      <mc:AlternateContent xmlns:mc="http://schemas.openxmlformats.org/markup-compatibility/2006" xmlns:a14="http://schemas.microsoft.com/office/drawing/2010/main">
+        <mc:Choice Requires="a14">
+          <p:sp>
+            <p:nvSpPr>
+              <p:cNvPr id="3" name="Inhaltsplatzhalter 2"/>
+              <p:cNvSpPr>
+                <a:spLocks noGrp="1"/>
+              </p:cNvSpPr>
+              <p:nvPr>
+                <p:ph idx="1"/>
+              </p:nvPr>
+            </p:nvSpPr>
+            <p:spPr/>
+            <p:txBody>
+              <a:bodyPr/>
+              <a:lstStyle/>
+              <a:p>
+                <a:pPr marL="0" indent="0">
+                  <a:buNone/>
+                </a:pPr>
+                <a:r>
+                  <a:rPr lang="de-DE" dirty="0">
+                    <a:latin typeface="Cambria Math" panose="02040503050406030204" pitchFamily="18" charset="0"/>
+                  </a:rPr>
+                  <a:t>Auswahlregel:</a:t>
+                </a:r>
+              </a:p>
+              <a:p>
+                <a:pPr marL="0" indent="0">
+                  <a:buNone/>
+                </a:pPr>
+                <a14:m>
+                  <m:oMathPara xmlns:m="http://schemas.openxmlformats.org/officeDocument/2006/math">
+                    <m:oMathParaPr>
+                      <m:jc m:val="left"/>
+                    </m:oMathParaPr>
+                    <m:oMath xmlns:m="http://schemas.openxmlformats.org/officeDocument/2006/math">
+                      <m:r>
+                        <m:rPr>
+                          <m:sty m:val="p"/>
+                        </m:rPr>
+                        <a:rPr lang="el-GR" i="1" smtClean="0">
+                          <a:latin typeface="Cambria Math" panose="02040503050406030204" pitchFamily="18" charset="0"/>
+                        </a:rPr>
+                        <m:t>χ</m:t>
+                      </m:r>
+                      <m:d>
+                        <m:dPr>
+                          <m:ctrlPr>
+                            <a:rPr lang="de-DE" i="1">
+                              <a:latin typeface="Cambria Math" panose="02040503050406030204" pitchFamily="18" charset="0"/>
+                            </a:rPr>
+                          </m:ctrlPr>
+                        </m:dPr>
+                        <m:e>
+                          <m:acc>
+                            <m:accPr>
+                              <m:chr m:val="̂"/>
+                              <m:ctrlPr>
+                                <a:rPr lang="de-DE" i="1">
+                                  <a:latin typeface="Cambria Math" panose="02040503050406030204" pitchFamily="18" charset="0"/>
+                                </a:rPr>
+                              </m:ctrlPr>
+                            </m:accPr>
+                            <m:e>
+                              <m:r>
+                                <a:rPr lang="de-DE" i="1">
+                                  <a:latin typeface="Cambria Math" panose="02040503050406030204" pitchFamily="18" charset="0"/>
+                                </a:rPr>
+                                <m:t>𝑣</m:t>
+                              </m:r>
+                            </m:e>
+                          </m:acc>
+                        </m:e>
+                      </m:d>
+                      <m:r>
+                        <a:rPr lang="de-DE" i="1">
+                          <a:latin typeface="Cambria Math" panose="02040503050406030204" pitchFamily="18" charset="0"/>
+                        </a:rPr>
+                        <m:t>=</m:t>
+                      </m:r>
+                      <m:func>
+                        <m:funcPr>
+                          <m:ctrlPr>
+                            <a:rPr lang="de-DE" b="0" i="1" smtClean="0">
+                              <a:latin typeface="Cambria Math" panose="02040503050406030204" pitchFamily="18" charset="0"/>
+                            </a:rPr>
+                          </m:ctrlPr>
+                        </m:funcPr>
+                        <m:fName>
+                          <m:r>
+                            <m:rPr>
+                              <m:sty m:val="p"/>
+                            </m:rPr>
+                            <a:rPr lang="de-DE" b="0" i="0" smtClean="0">
+                              <a:latin typeface="Cambria Math" panose="02040503050406030204" pitchFamily="18" charset="0"/>
+                            </a:rPr>
+                            <m:t>arg</m:t>
+                          </m:r>
+                        </m:fName>
+                        <m:e>
+                          <m:func>
+                            <m:funcPr>
+                              <m:ctrlPr>
+                                <a:rPr lang="de-DE" b="0" i="1" smtClean="0">
+                                  <a:latin typeface="Cambria Math" panose="02040503050406030204" pitchFamily="18" charset="0"/>
+                                </a:rPr>
+                              </m:ctrlPr>
+                            </m:funcPr>
+                            <m:fName>
+                              <m:limLow>
+                                <m:limLowPr>
+                                  <m:ctrlPr>
+                                    <a:rPr lang="de-DE" b="0" i="1" smtClean="0">
+                                      <a:latin typeface="Cambria Math" panose="02040503050406030204" pitchFamily="18" charset="0"/>
+                                    </a:rPr>
+                                  </m:ctrlPr>
+                                </m:limLowPr>
+                                <m:e>
+                                  <m:r>
+                                    <m:rPr>
+                                      <m:sty m:val="p"/>
+                                    </m:rPr>
+                                    <a:rPr lang="de-DE" b="0" i="0" smtClean="0">
+                                      <a:latin typeface="Cambria Math" panose="02040503050406030204" pitchFamily="18" charset="0"/>
+                                    </a:rPr>
+                                    <m:t>max</m:t>
+                                  </m:r>
+                                </m:e>
+                                <m:lim>
+                                  <m:r>
+                                    <a:rPr lang="de-DE" b="0" i="1" smtClean="0">
+                                      <a:latin typeface="Cambria Math" panose="02040503050406030204" pitchFamily="18" charset="0"/>
+                                    </a:rPr>
+                                    <m:t>𝑥</m:t>
+                                  </m:r>
+                                  <m:r>
+                                    <a:rPr lang="de-DE" b="0" i="1" smtClean="0">
+                                      <a:latin typeface="Cambria Math" panose="02040503050406030204" pitchFamily="18" charset="0"/>
+                                      <a:ea typeface="Cambria Math" panose="02040503050406030204" pitchFamily="18" charset="0"/>
+                                    </a:rPr>
+                                    <m:t>∈</m:t>
+                                  </m:r>
+                                  <m:r>
+                                    <a:rPr lang="de-DE" b="0" i="1" smtClean="0">
+                                      <a:latin typeface="Cambria Math" panose="02040503050406030204" pitchFamily="18" charset="0"/>
+                                      <a:ea typeface="Cambria Math" panose="02040503050406030204" pitchFamily="18" charset="0"/>
+                                    </a:rPr>
+                                    <m:t>𝑋</m:t>
+                                  </m:r>
+                                </m:lim>
+                              </m:limLow>
+                            </m:fName>
+                            <m:e>
+                              <m:nary>
+                                <m:naryPr>
+                                  <m:chr m:val="∑"/>
+                                  <m:supHide m:val="on"/>
+                                  <m:ctrlPr>
+                                    <a:rPr lang="de-DE" b="0" i="1" smtClean="0">
+                                      <a:latin typeface="Cambria Math" panose="02040503050406030204" pitchFamily="18" charset="0"/>
+                                    </a:rPr>
+                                  </m:ctrlPr>
+                                </m:naryPr>
+                                <m:sub>
+                                  <m:r>
+                                    <m:rPr>
+                                      <m:brk m:alnAt="7"/>
+                                    </m:rPr>
+                                    <a:rPr lang="de-DE" b="0" i="1" smtClean="0">
+                                      <a:latin typeface="Cambria Math" panose="02040503050406030204" pitchFamily="18" charset="0"/>
+                                    </a:rPr>
+                                    <m:t>𝑖</m:t>
+                                  </m:r>
+                                </m:sub>
+                                <m:sup/>
+                                <m:e>
+                                  <m:sSub>
+                                    <m:sSubPr>
+                                      <m:ctrlPr>
+                                        <a:rPr lang="de-DE" b="0" i="1" smtClean="0">
+                                          <a:latin typeface="Cambria Math" panose="02040503050406030204" pitchFamily="18" charset="0"/>
+                                        </a:rPr>
+                                      </m:ctrlPr>
+                                    </m:sSubPr>
+                                    <m:e>
+                                      <m:acc>
+                                        <m:accPr>
+                                          <m:chr m:val="̂"/>
+                                          <m:ctrlPr>
+                                            <a:rPr lang="de-DE" b="0" i="1" smtClean="0">
+                                              <a:latin typeface="Cambria Math" panose="02040503050406030204" pitchFamily="18" charset="0"/>
+                                            </a:rPr>
+                                          </m:ctrlPr>
+                                        </m:accPr>
+                                        <m:e>
+                                          <m:r>
+                                            <a:rPr lang="de-DE" b="0" i="1" smtClean="0">
+                                              <a:latin typeface="Cambria Math" panose="02040503050406030204" pitchFamily="18" charset="0"/>
+                                            </a:rPr>
+                                            <m:t>𝑣</m:t>
+                                          </m:r>
+                                        </m:e>
+                                      </m:acc>
+                                    </m:e>
+                                    <m:sub>
+                                      <m:r>
+                                        <a:rPr lang="de-DE" b="0" i="1" smtClean="0">
+                                          <a:latin typeface="Cambria Math" panose="02040503050406030204" pitchFamily="18" charset="0"/>
+                                        </a:rPr>
+                                        <m:t>𝑖</m:t>
+                                      </m:r>
+                                    </m:sub>
+                                  </m:sSub>
+                                  <m:r>
+                                    <a:rPr lang="de-DE" b="0" i="1" smtClean="0">
+                                      <a:latin typeface="Cambria Math" panose="02040503050406030204" pitchFamily="18" charset="0"/>
+                                    </a:rPr>
+                                    <m:t>(</m:t>
+                                  </m:r>
+                                  <m:r>
+                                    <a:rPr lang="de-DE" b="0" i="1" smtClean="0">
+                                      <a:latin typeface="Cambria Math" panose="02040503050406030204" pitchFamily="18" charset="0"/>
+                                    </a:rPr>
+                                    <m:t>𝑥</m:t>
+                                  </m:r>
+                                  <m:r>
+                                    <a:rPr lang="de-DE" b="0" i="1" smtClean="0">
+                                      <a:latin typeface="Cambria Math" panose="02040503050406030204" pitchFamily="18" charset="0"/>
+                                    </a:rPr>
+                                    <m:t>)</m:t>
+                                  </m:r>
+                                </m:e>
+                              </m:nary>
+                            </m:e>
+                          </m:func>
+                        </m:e>
+                      </m:func>
+                    </m:oMath>
+                  </m:oMathPara>
+                </a14:m>
+                <a:endParaRPr lang="de-DE" i="1" dirty="0">
+                  <a:latin typeface="Cambria Math" panose="02040503050406030204" pitchFamily="18" charset="0"/>
+                </a:endParaRPr>
+              </a:p>
+              <a:p>
+                <a:pPr marL="0" indent="0">
+                  <a:buNone/>
+                </a:pPr>
+                <a:endParaRPr lang="de-DE" i="1" dirty="0">
+                  <a:latin typeface="Cambria Math" panose="02040503050406030204" pitchFamily="18" charset="0"/>
+                </a:endParaRPr>
+              </a:p>
+              <a:p>
+                <a:pPr marL="0" indent="0">
+                  <a:buNone/>
+                </a:pPr>
+                <a:endParaRPr lang="de-DE" i="1" dirty="0">
+                  <a:latin typeface="Cambria Math" panose="02040503050406030204" pitchFamily="18" charset="0"/>
+                </a:endParaRPr>
+              </a:p>
+              <a:p>
+                <a:pPr marL="0" indent="0">
+                  <a:buNone/>
+                </a:pPr>
+                <a:endParaRPr lang="de-DE" i="1" dirty="0">
+                  <a:latin typeface="Cambria Math" panose="02040503050406030204" pitchFamily="18" charset="0"/>
+                </a:endParaRPr>
+              </a:p>
+              <a:p>
+                <a:pPr marL="0" indent="0">
+                  <a:buNone/>
+                </a:pPr>
+                <a:endParaRPr lang="de-DE" i="1" dirty="0">
+                  <a:latin typeface="Cambria Math" panose="02040503050406030204" pitchFamily="18" charset="0"/>
+                </a:endParaRPr>
+              </a:p>
+              <a:p>
+                <a:pPr marL="0" indent="0">
+                  <a:buNone/>
+                </a:pPr>
+                <a14:m>
+                  <m:oMathPara xmlns:m="http://schemas.openxmlformats.org/officeDocument/2006/math">
+                    <m:oMathParaPr>
+                      <m:jc m:val="left"/>
+                    </m:oMathParaPr>
+                    <m:oMath xmlns:m="http://schemas.openxmlformats.org/officeDocument/2006/math">
+                      <m:r>
+                        <m:rPr>
+                          <m:sty m:val="p"/>
+                        </m:rPr>
+                        <a:rPr lang="el-GR" i="1">
+                          <a:latin typeface="Cambria Math" panose="02040503050406030204" pitchFamily="18" charset="0"/>
+                        </a:rPr>
+                        <m:t>χ</m:t>
+                      </m:r>
+                      <m:d>
+                        <m:dPr>
+                          <m:ctrlPr>
+                            <a:rPr lang="de-DE" i="1">
+                              <a:latin typeface="Cambria Math" panose="02040503050406030204" pitchFamily="18" charset="0"/>
+                            </a:rPr>
+                          </m:ctrlPr>
+                        </m:dPr>
+                        <m:e>
+                          <m:acc>
+                            <m:accPr>
+                              <m:chr m:val="̂"/>
+                              <m:ctrlPr>
+                                <a:rPr lang="de-DE" i="1">
+                                  <a:latin typeface="Cambria Math" panose="02040503050406030204" pitchFamily="18" charset="0"/>
+                                </a:rPr>
+                              </m:ctrlPr>
+                            </m:accPr>
+                            <m:e>
+                              <m:r>
+                                <a:rPr lang="de-DE" i="1">
+                                  <a:latin typeface="Cambria Math" panose="02040503050406030204" pitchFamily="18" charset="0"/>
+                                </a:rPr>
+                                <m:t>𝑣</m:t>
+                              </m:r>
+                            </m:e>
+                          </m:acc>
+                        </m:e>
+                      </m:d>
+                      <m:r>
+                        <a:rPr lang="de-DE" i="1">
+                          <a:latin typeface="Cambria Math" panose="02040503050406030204" pitchFamily="18" charset="0"/>
+                        </a:rPr>
+                        <m:t>=</m:t>
+                      </m:r>
+                      <m:r>
+                        <a:rPr lang="de-DE" i="1">
+                          <a:latin typeface="Cambria Math" panose="02040503050406030204" pitchFamily="18" charset="0"/>
+                        </a:rPr>
+                        <m:t>𝐴</m:t>
+                      </m:r>
+                    </m:oMath>
+                  </m:oMathPara>
+                </a14:m>
+                <a:endParaRPr lang="de-DE" dirty="0"/>
+              </a:p>
+              <a:p>
+                <a:pPr marL="0" indent="0">
+                  <a:buNone/>
+                </a:pPr>
+                <a:endParaRPr lang="de-DE" dirty="0"/>
+              </a:p>
+            </p:txBody>
+          </p:sp>
+        </mc:Choice>
+        <mc:Fallback xmlns="">
+          <p:sp>
+            <p:nvSpPr>
+              <p:cNvPr id="3" name="Inhaltsplatzhalter 2"/>
+              <p:cNvSpPr>
+                <a:spLocks noGrp="1" noRot="1" noChangeAspect="1" noMove="1" noResize="1" noEditPoints="1" noAdjustHandles="1" noChangeArrowheads="1" noChangeShapeType="1" noTextEdit="1"/>
+              </p:cNvSpPr>
+              <p:nvPr>
+                <p:ph idx="1"/>
+              </p:nvPr>
+            </p:nvSpPr>
+            <p:spPr>
+              <a:blipFill>
+                <a:blip r:embed="rId2"/>
+                <a:stretch>
+                  <a:fillRect l="-1515" t="-1667"/>
+                </a:stretch>
+              </a:blipFill>
+            </p:spPr>
+            <p:txBody>
+              <a:bodyPr/>
+              <a:lstStyle/>
+              <a:p>
+                <a:r>
+                  <a:rPr lang="de-DE">
+                    <a:noFill/>
+                  </a:rPr>
+                  <a:t> </a:t>
+                </a:r>
+              </a:p>
+            </p:txBody>
+          </p:sp>
+        </mc:Fallback>
+      </mc:AlternateContent>
+      <mc:AlternateContent xmlns:mc="http://schemas.openxmlformats.org/markup-compatibility/2006" xmlns:a14="http://schemas.microsoft.com/office/drawing/2010/main">
+        <mc:Choice Requires="a14">
           <p:graphicFrame>
             <p:nvGraphicFramePr>
-              <p:cNvPr id="4" name="Tabelle 3"/>
+              <p:cNvPr id="5" name="Tabelle 4"/>
               <p:cNvGraphicFramePr>
                 <a:graphicFrameLocks noGrp="1"/>
               </p:cNvGraphicFramePr>
               <p:nvPr>
                 <p:extLst>
                   <p:ext uri="{D42A27DB-BD31-4B8C-83A1-F6EECF244321}">
-                    <p14:modId xmlns:p14="http://schemas.microsoft.com/office/powerpoint/2010/main" val="1395949148"/>
+                    <p14:modId xmlns:p14="http://schemas.microsoft.com/office/powerpoint/2010/main" val="2942075079"/>
                   </p:ext>
                 </p:extLst>
               </p:nvPr>
             </p:nvGraphicFramePr>
             <p:xfrm>
-              <a:off x="1097280" y="2692668"/>
+              <a:off x="1097280" y="3118274"/>
               <a:ext cx="8128000" cy="1478280"/>
             </p:xfrm>
             <a:graphic>
@@ -4782,6 +5500,7 @@
                         <a:bodyPr/>
                         <a:lstStyle/>
                         <a:p>
+                          <a:pPr/>
                           <a14:m>
                             <m:oMathPara xmlns:m="http://schemas.openxmlformats.org/officeDocument/2006/math">
                               <m:oMathParaPr>
@@ -4826,6 +5545,7 @@
                         <a:bodyPr/>
                         <a:lstStyle/>
                         <a:p>
+                          <a:pPr/>
                           <a14:m>
                             <m:oMathPara xmlns:m="http://schemas.openxmlformats.org/officeDocument/2006/math">
                               <m:oMathParaPr>
@@ -4870,6 +5590,7 @@
                         <a:bodyPr/>
                         <a:lstStyle/>
                         <a:p>
+                          <a:pPr/>
                           <a14:m>
                             <m:oMathPara xmlns:m="http://schemas.openxmlformats.org/officeDocument/2006/math">
                               <m:oMathParaPr>
@@ -4915,10 +5636,9 @@
                         <a:lstStyle/>
                         <a:p>
                           <a:r>
-                            <a:rPr lang="de-DE" dirty="0" smtClean="0"/>
+                            <a:rPr lang="de-DE" dirty="0"/>
                             <a:t>∑</a:t>
                           </a:r>
-                          <a:endParaRPr lang="de-DE" dirty="0"/>
                         </a:p>
                       </a:txBody>
                       <a:tcPr/>
@@ -4936,10 +5656,9 @@
                         <a:lstStyle/>
                         <a:p>
                           <a:r>
-                            <a:rPr lang="de-DE" dirty="0" smtClean="0"/>
+                            <a:rPr lang="de-DE" dirty="0"/>
                             <a:t>A</a:t>
                           </a:r>
-                          <a:endParaRPr lang="de-DE" dirty="0"/>
                         </a:p>
                       </a:txBody>
                       <a:tcPr/>
@@ -4950,10 +5669,9 @@
                         <a:lstStyle/>
                         <a:p>
                           <a:r>
-                            <a:rPr lang="de-DE" dirty="0" smtClean="0"/>
+                            <a:rPr lang="de-DE" dirty="0"/>
                             <a:t>-15</a:t>
                           </a:r>
-                          <a:endParaRPr lang="de-DE" dirty="0"/>
                         </a:p>
                       </a:txBody>
                       <a:tcPr/>
@@ -4964,10 +5682,9 @@
                         <a:lstStyle/>
                         <a:p>
                           <a:r>
-                            <a:rPr lang="de-DE" dirty="0" smtClean="0"/>
+                            <a:rPr lang="de-DE" dirty="0"/>
                             <a:t>0</a:t>
                           </a:r>
-                          <a:endParaRPr lang="de-DE" dirty="0"/>
                         </a:p>
                       </a:txBody>
                       <a:tcPr/>
@@ -4978,10 +5695,9 @@
                         <a:lstStyle/>
                         <a:p>
                           <a:r>
-                            <a:rPr lang="de-DE" dirty="0" smtClean="0"/>
+                            <a:rPr lang="de-DE" dirty="0"/>
                             <a:t>0</a:t>
                           </a:r>
-                          <a:endParaRPr lang="de-DE" dirty="0"/>
                         </a:p>
                       </a:txBody>
                       <a:tcPr/>
@@ -4992,10 +5708,9 @@
                         <a:lstStyle/>
                         <a:p>
                           <a:r>
-                            <a:rPr lang="de-DE" dirty="0" smtClean="0"/>
+                            <a:rPr lang="de-DE" dirty="0"/>
                             <a:t>-15</a:t>
                           </a:r>
-                          <a:endParaRPr lang="de-DE" dirty="0"/>
                         </a:p>
                       </a:txBody>
                       <a:tcPr/>
@@ -5013,10 +5728,9 @@
                         <a:lstStyle/>
                         <a:p>
                           <a:r>
-                            <a:rPr lang="de-DE" dirty="0" smtClean="0"/>
+                            <a:rPr lang="de-DE" dirty="0"/>
                             <a:t>B</a:t>
                           </a:r>
-                          <a:endParaRPr lang="de-DE" dirty="0"/>
                         </a:p>
                       </a:txBody>
                       <a:tcPr/>
@@ -5027,10 +5741,9 @@
                         <a:lstStyle/>
                         <a:p>
                           <a:r>
-                            <a:rPr lang="de-DE" dirty="0" smtClean="0"/>
+                            <a:rPr lang="de-DE" dirty="0"/>
                             <a:t>0</a:t>
                           </a:r>
-                          <a:endParaRPr lang="de-DE" dirty="0"/>
                         </a:p>
                       </a:txBody>
                       <a:tcPr/>
@@ -5041,10 +5754,9 @@
                         <a:lstStyle/>
                         <a:p>
                           <a:r>
-                            <a:rPr lang="de-DE" dirty="0" smtClean="0"/>
+                            <a:rPr lang="de-DE" dirty="0"/>
                             <a:t>-21</a:t>
                           </a:r>
-                          <a:endParaRPr lang="de-DE" dirty="0"/>
                         </a:p>
                       </a:txBody>
                       <a:tcPr/>
@@ -5055,10 +5767,9 @@
                         <a:lstStyle/>
                         <a:p>
                           <a:r>
-                            <a:rPr lang="de-DE" dirty="0" smtClean="0"/>
+                            <a:rPr lang="de-DE" dirty="0"/>
                             <a:t>0</a:t>
                           </a:r>
-                          <a:endParaRPr lang="de-DE" dirty="0"/>
                         </a:p>
                       </a:txBody>
                       <a:tcPr/>
@@ -5069,10 +5780,9 @@
                         <a:lstStyle/>
                         <a:p>
                           <a:r>
-                            <a:rPr lang="de-DE" dirty="0" smtClean="0"/>
+                            <a:rPr lang="de-DE" dirty="0"/>
                             <a:t>-21</a:t>
                           </a:r>
-                          <a:endParaRPr lang="de-DE" dirty="0"/>
                         </a:p>
                       </a:txBody>
                       <a:tcPr/>
@@ -5090,10 +5800,9 @@
                         <a:lstStyle/>
                         <a:p>
                           <a:r>
-                            <a:rPr lang="de-DE" dirty="0" smtClean="0"/>
+                            <a:rPr lang="de-DE" dirty="0"/>
                             <a:t>C</a:t>
                           </a:r>
-                          <a:endParaRPr lang="de-DE" dirty="0"/>
                         </a:p>
                       </a:txBody>
                       <a:tcPr/>
@@ -5104,10 +5813,9 @@
                         <a:lstStyle/>
                         <a:p>
                           <a:r>
-                            <a:rPr lang="de-DE" dirty="0" smtClean="0"/>
+                            <a:rPr lang="de-DE" dirty="0"/>
                             <a:t>0</a:t>
                           </a:r>
-                          <a:endParaRPr lang="de-DE" dirty="0"/>
                         </a:p>
                       </a:txBody>
                       <a:tcPr/>
@@ -5118,10 +5826,9 @@
                         <a:lstStyle/>
                         <a:p>
                           <a:r>
-                            <a:rPr lang="de-DE" dirty="0" smtClean="0"/>
+                            <a:rPr lang="de-DE" dirty="0"/>
                             <a:t>0</a:t>
                           </a:r>
-                          <a:endParaRPr lang="de-DE" dirty="0"/>
                         </a:p>
                       </a:txBody>
                       <a:tcPr/>
@@ -5132,10 +5839,9 @@
                         <a:lstStyle/>
                         <a:p>
                           <a:r>
-                            <a:rPr lang="de-DE" dirty="0" smtClean="0"/>
+                            <a:rPr lang="de-DE" dirty="0"/>
                             <a:t>-36</a:t>
                           </a:r>
-                          <a:endParaRPr lang="de-DE" dirty="0"/>
                         </a:p>
                       </a:txBody>
                       <a:tcPr/>
@@ -5146,10 +5852,9 @@
                         <a:lstStyle/>
                         <a:p>
                           <a:r>
-                            <a:rPr lang="de-DE" dirty="0" smtClean="0"/>
+                            <a:rPr lang="de-DE" dirty="0"/>
                             <a:t>-36</a:t>
                           </a:r>
-                          <a:endParaRPr lang="de-DE" dirty="0"/>
                         </a:p>
                       </a:txBody>
                       <a:tcPr/>
@@ -5165,23 +5870,23 @@
             </a:graphic>
           </p:graphicFrame>
         </mc:Choice>
-        <mc:Fallback>
+        <mc:Fallback xmlns="">
           <p:graphicFrame>
             <p:nvGraphicFramePr>
-              <p:cNvPr id="4" name="Tabelle 3"/>
+              <p:cNvPr id="5" name="Tabelle 4"/>
               <p:cNvGraphicFramePr>
                 <a:graphicFrameLocks noGrp="1"/>
               </p:cNvGraphicFramePr>
               <p:nvPr>
                 <p:extLst>
                   <p:ext uri="{D42A27DB-BD31-4B8C-83A1-F6EECF244321}">
-                    <p14:modId xmlns:p14="http://schemas.microsoft.com/office/powerpoint/2010/main" val="1395949148"/>
+                    <p14:modId xmlns:p14="http://schemas.microsoft.com/office/powerpoint/2010/main" val="2942075079"/>
                   </p:ext>
                 </p:extLst>
               </p:nvPr>
             </p:nvGraphicFramePr>
             <p:xfrm>
-              <a:off x="1097280" y="2692668"/>
+              <a:off x="1097280" y="3118274"/>
               <a:ext cx="8128000" cy="1478280"/>
             </p:xfrm>
             <a:graphic>
@@ -5295,10 +6000,9 @@
                         <a:lstStyle/>
                         <a:p>
                           <a:r>
-                            <a:rPr lang="de-DE" dirty="0" smtClean="0"/>
+                            <a:rPr lang="de-DE" dirty="0"/>
                             <a:t>∑</a:t>
                           </a:r>
-                          <a:endParaRPr lang="de-DE" dirty="0"/>
                         </a:p>
                       </a:txBody>
                       <a:tcPr/>
@@ -5316,10 +6020,9 @@
                         <a:lstStyle/>
                         <a:p>
                           <a:r>
-                            <a:rPr lang="de-DE" dirty="0" smtClean="0"/>
+                            <a:rPr lang="de-DE" dirty="0"/>
                             <a:t>A</a:t>
                           </a:r>
-                          <a:endParaRPr lang="de-DE" dirty="0"/>
                         </a:p>
                       </a:txBody>
                       <a:tcPr/>
@@ -5330,10 +6033,9 @@
                         <a:lstStyle/>
                         <a:p>
                           <a:r>
-                            <a:rPr lang="de-DE" dirty="0" smtClean="0"/>
+                            <a:rPr lang="de-DE" dirty="0"/>
                             <a:t>-15</a:t>
                           </a:r>
-                          <a:endParaRPr lang="de-DE" dirty="0"/>
                         </a:p>
                       </a:txBody>
                       <a:tcPr/>
@@ -5344,10 +6046,9 @@
                         <a:lstStyle/>
                         <a:p>
                           <a:r>
-                            <a:rPr lang="de-DE" dirty="0" smtClean="0"/>
+                            <a:rPr lang="de-DE" dirty="0"/>
                             <a:t>0</a:t>
                           </a:r>
-                          <a:endParaRPr lang="de-DE" dirty="0"/>
                         </a:p>
                       </a:txBody>
                       <a:tcPr/>
@@ -5358,10 +6059,9 @@
                         <a:lstStyle/>
                         <a:p>
                           <a:r>
-                            <a:rPr lang="de-DE" dirty="0" smtClean="0"/>
+                            <a:rPr lang="de-DE" dirty="0"/>
                             <a:t>0</a:t>
                           </a:r>
-                          <a:endParaRPr lang="de-DE" dirty="0"/>
                         </a:p>
                       </a:txBody>
                       <a:tcPr/>
@@ -5372,10 +6072,9 @@
                         <a:lstStyle/>
                         <a:p>
                           <a:r>
-                            <a:rPr lang="de-DE" dirty="0" smtClean="0"/>
+                            <a:rPr lang="de-DE" dirty="0"/>
                             <a:t>-15</a:t>
                           </a:r>
-                          <a:endParaRPr lang="de-DE" dirty="0"/>
                         </a:p>
                       </a:txBody>
                       <a:tcPr/>
@@ -5393,10 +6092,9 @@
                         <a:lstStyle/>
                         <a:p>
                           <a:r>
-                            <a:rPr lang="de-DE" dirty="0" smtClean="0"/>
+                            <a:rPr lang="de-DE" dirty="0"/>
                             <a:t>B</a:t>
                           </a:r>
-                          <a:endParaRPr lang="de-DE" dirty="0"/>
                         </a:p>
                       </a:txBody>
                       <a:tcPr/>
@@ -5407,10 +6105,9 @@
                         <a:lstStyle/>
                         <a:p>
                           <a:r>
-                            <a:rPr lang="de-DE" dirty="0" smtClean="0"/>
+                            <a:rPr lang="de-DE" dirty="0"/>
                             <a:t>0</a:t>
                           </a:r>
-                          <a:endParaRPr lang="de-DE" dirty="0"/>
                         </a:p>
                       </a:txBody>
                       <a:tcPr/>
@@ -5421,10 +6118,9 @@
                         <a:lstStyle/>
                         <a:p>
                           <a:r>
-                            <a:rPr lang="de-DE" dirty="0" smtClean="0"/>
+                            <a:rPr lang="de-DE" dirty="0"/>
                             <a:t>-21</a:t>
                           </a:r>
-                          <a:endParaRPr lang="de-DE" dirty="0"/>
                         </a:p>
                       </a:txBody>
                       <a:tcPr/>
@@ -5435,10 +6131,9 @@
                         <a:lstStyle/>
                         <a:p>
                           <a:r>
-                            <a:rPr lang="de-DE" dirty="0" smtClean="0"/>
+                            <a:rPr lang="de-DE" dirty="0"/>
                             <a:t>0</a:t>
                           </a:r>
-                          <a:endParaRPr lang="de-DE" dirty="0"/>
                         </a:p>
                       </a:txBody>
                       <a:tcPr/>
@@ -5449,10 +6144,9 @@
                         <a:lstStyle/>
                         <a:p>
                           <a:r>
-                            <a:rPr lang="de-DE" dirty="0" smtClean="0"/>
+                            <a:rPr lang="de-DE" dirty="0"/>
                             <a:t>-21</a:t>
                           </a:r>
-                          <a:endParaRPr lang="de-DE" dirty="0"/>
                         </a:p>
                       </a:txBody>
                       <a:tcPr/>
@@ -5470,10 +6164,9 @@
                         <a:lstStyle/>
                         <a:p>
                           <a:r>
-                            <a:rPr lang="de-DE" dirty="0" smtClean="0"/>
+                            <a:rPr lang="de-DE" dirty="0"/>
                             <a:t>C</a:t>
                           </a:r>
-                          <a:endParaRPr lang="de-DE" dirty="0"/>
                         </a:p>
                       </a:txBody>
                       <a:tcPr/>
@@ -5484,10 +6177,9 @@
                         <a:lstStyle/>
                         <a:p>
                           <a:r>
-                            <a:rPr lang="de-DE" dirty="0" smtClean="0"/>
+                            <a:rPr lang="de-DE" dirty="0"/>
                             <a:t>0</a:t>
                           </a:r>
-                          <a:endParaRPr lang="de-DE" dirty="0"/>
                         </a:p>
                       </a:txBody>
                       <a:tcPr/>
@@ -5498,10 +6190,9 @@
                         <a:lstStyle/>
                         <a:p>
                           <a:r>
-                            <a:rPr lang="de-DE" dirty="0" smtClean="0"/>
+                            <a:rPr lang="de-DE" dirty="0"/>
                             <a:t>0</a:t>
                           </a:r>
-                          <a:endParaRPr lang="de-DE" dirty="0"/>
                         </a:p>
                       </a:txBody>
                       <a:tcPr/>
@@ -5512,10 +6203,9 @@
                         <a:lstStyle/>
                         <a:p>
                           <a:r>
-                            <a:rPr lang="de-DE" dirty="0" smtClean="0"/>
+                            <a:rPr lang="de-DE" dirty="0"/>
                             <a:t>-36</a:t>
                           </a:r>
-                          <a:endParaRPr lang="de-DE" dirty="0"/>
                         </a:p>
                       </a:txBody>
                       <a:tcPr/>
@@ -5526,10 +6216,9 @@
                         <a:lstStyle/>
                         <a:p>
                           <a:r>
-                            <a:rPr lang="de-DE" dirty="0" smtClean="0"/>
+                            <a:rPr lang="de-DE" dirty="0"/>
                             <a:t>-36</a:t>
                           </a:r>
-                          <a:endParaRPr lang="de-DE" dirty="0"/>
                         </a:p>
                       </a:txBody>
                       <a:tcPr/>
@@ -5549,7 +6238,7 @@
     </p:spTree>
     <p:extLst>
       <p:ext uri="{BB962C8B-B14F-4D97-AF65-F5344CB8AC3E}">
-        <p14:creationId xmlns:p14="http://schemas.microsoft.com/office/powerpoint/2010/main" val="3677205065"/>
+        <p14:creationId xmlns:p14="http://schemas.microsoft.com/office/powerpoint/2010/main" val="2375642725"/>
       </p:ext>
     </p:extLst>
   </p:cSld>
@@ -5559,7 +6248,7 @@
 </p:sld>
 </file>
 
-<file path=ppt/slides/slide5.xml><?xml version="1.0" encoding="utf-8"?>
+<file path=ppt/slides/slide6.xml><?xml version="1.0" encoding="utf-8"?>
 <p:sld xmlns:a="http://schemas.openxmlformats.org/drawingml/2006/main" xmlns:r="http://schemas.openxmlformats.org/officeDocument/2006/relationships" xmlns:p="http://schemas.openxmlformats.org/presentationml/2006/main">
   <p:cSld>
     <p:spTree>
@@ -5576,74 +6265,96 @@
           <a:chExt cx="0" cy="0"/>
         </a:xfrm>
       </p:grpSpPr>
-      <p:pic>
-        <p:nvPicPr>
-          <p:cNvPr id="2" name="Grafik 1"/>
-          <p:cNvPicPr>
-            <a:picLocks noChangeAspect="1"/>
-          </p:cNvPicPr>
-          <p:nvPr/>
-        </p:nvPicPr>
-        <p:blipFill>
-          <a:blip r:embed="rId2"/>
-          <a:stretch>
-            <a:fillRect/>
-          </a:stretch>
-        </p:blipFill>
-        <p:spPr>
-          <a:xfrm>
-            <a:off x="1675398" y="884622"/>
-            <a:ext cx="8458200" cy="2314575"/>
-          </a:xfrm>
-          <a:prstGeom prst="rect">
-            <a:avLst/>
-          </a:prstGeom>
-        </p:spPr>
-      </p:pic>
-      <mc:AlternateContent xmlns:mc="http://schemas.openxmlformats.org/markup-compatibility/2006">
-        <mc:Choice xmlns:a14="http://schemas.microsoft.com/office/drawing/2010/main" Requires="a14">
+      <p:sp>
+        <p:nvSpPr>
+          <p:cNvPr id="2" name="Titel 1"/>
+          <p:cNvSpPr>
+            <a:spLocks noGrp="1"/>
+          </p:cNvSpPr>
+          <p:nvPr>
+            <p:ph type="title"/>
+          </p:nvPr>
+        </p:nvSpPr>
+        <p:spPr/>
+        <p:txBody>
+          <a:bodyPr/>
+          <a:lstStyle/>
+          <a:p>
+            <a:r>
+              <a:rPr lang="de-DE" dirty="0"/>
+              <a:t>Aufgabe 1b</a:t>
+            </a:r>
+          </a:p>
+        </p:txBody>
+      </p:sp>
+      <mc:AlternateContent xmlns:mc="http://schemas.openxmlformats.org/markup-compatibility/2006" xmlns:a14="http://schemas.microsoft.com/office/drawing/2010/main">
+        <mc:Choice Requires="a14">
           <p:sp>
             <p:nvSpPr>
-              <p:cNvPr id="3" name="Textfeld 2"/>
-              <p:cNvSpPr txBox="1"/>
-              <p:nvPr/>
+              <p:cNvPr id="3" name="Inhaltsplatzhalter 2"/>
+              <p:cNvSpPr>
+                <a:spLocks noGrp="1"/>
+              </p:cNvSpPr>
+              <p:nvPr>
+                <p:ph idx="1"/>
+              </p:nvPr>
             </p:nvSpPr>
-            <p:spPr>
-              <a:xfrm>
-                <a:off x="1675398" y="3785937"/>
-                <a:ext cx="8648699" cy="1754326"/>
-              </a:xfrm>
-              <a:prstGeom prst="rect">
-                <a:avLst/>
-              </a:prstGeom>
-              <a:noFill/>
-            </p:spPr>
+            <p:spPr/>
             <p:txBody>
-              <a:bodyPr wrap="square" rtlCol="0">
-                <a:spAutoFit/>
+              <a:bodyPr>
+                <a:normAutofit/>
               </a:bodyPr>
               <a:lstStyle/>
               <a:p>
-                <a:pPr/>
+                <a:pPr marL="0" indent="0">
+                  <a:buNone/>
+                </a:pPr>
+                <a:r>
+                  <a:rPr lang="de-DE" dirty="0">
+                    <a:latin typeface="Cambria Math" panose="02040503050406030204" pitchFamily="18" charset="0"/>
+                  </a:rPr>
+                  <a:t>Bezahlungsregel:</a:t>
+                </a:r>
+              </a:p>
+              <a:p>
+                <a:pPr marL="0" indent="0">
+                  <a:buNone/>
+                </a:pPr>
                 <a14:m>
                   <m:oMathPara xmlns:m="http://schemas.openxmlformats.org/officeDocument/2006/math">
                     <m:oMathParaPr>
                       <m:jc m:val="left"/>
                     </m:oMathParaPr>
                     <m:oMath xmlns:m="http://schemas.openxmlformats.org/officeDocument/2006/math">
-                      <m:r>
-                        <m:rPr>
-                          <m:sty m:val="p"/>
-                        </m:rPr>
-                        <a:rPr lang="el-GR" i="1" smtClean="0">
-                          <a:latin typeface="Cambria Math" panose="02040503050406030204" pitchFamily="18" charset="0"/>
-                        </a:rPr>
-                        <m:t>χ</m:t>
-                      </m:r>
+                      <m:sSub>
+                        <m:sSubPr>
+                          <m:ctrlPr>
+                            <a:rPr lang="de-DE" i="1" smtClean="0">
+                              <a:latin typeface="Cambria Math" panose="02040503050406030204" pitchFamily="18" charset="0"/>
+                            </a:rPr>
+                          </m:ctrlPr>
+                        </m:sSubPr>
+                        <m:e>
+                          <m:r>
+                            <a:rPr lang="de-DE" i="1">
+                              <a:latin typeface="Cambria Math" panose="02040503050406030204" pitchFamily="18" charset="0"/>
+                            </a:rPr>
+                            <m:t>𝑝</m:t>
+                          </m:r>
+                        </m:e>
+                        <m:sub>
+                          <m:r>
+                            <a:rPr lang="de-DE" b="0" i="1" smtClean="0">
+                              <a:latin typeface="Cambria Math" panose="02040503050406030204" pitchFamily="18" charset="0"/>
+                            </a:rPr>
+                            <m:t>𝑖</m:t>
+                          </m:r>
+                        </m:sub>
+                      </m:sSub>
                       <m:d>
                         <m:dPr>
                           <m:ctrlPr>
-                            <a:rPr lang="de-DE" b="0" i="1" smtClean="0">
+                            <a:rPr lang="de-DE" i="1">
                               <a:latin typeface="Cambria Math" panose="02040503050406030204" pitchFamily="18" charset="0"/>
                             </a:rPr>
                           </m:ctrlPr>
@@ -5653,14 +6364,14 @@
                             <m:accPr>
                               <m:chr m:val="̂"/>
                               <m:ctrlPr>
-                                <a:rPr lang="de-DE" b="0" i="1" smtClean="0">
+                                <a:rPr lang="de-DE" i="1">
                                   <a:latin typeface="Cambria Math" panose="02040503050406030204" pitchFamily="18" charset="0"/>
                                 </a:rPr>
                               </m:ctrlPr>
                             </m:accPr>
                             <m:e>
                               <m:r>
-                                <a:rPr lang="de-DE" b="0" i="1" smtClean="0">
+                                <a:rPr lang="de-DE" i="1">
                                   <a:latin typeface="Cambria Math" panose="02040503050406030204" pitchFamily="18" charset="0"/>
                                 </a:rPr>
                                 <m:t>𝑣</m:t>
@@ -5670,28 +6381,293 @@
                         </m:e>
                       </m:d>
                       <m:r>
-                        <a:rPr lang="de-DE" b="0" i="1" smtClean="0">
+                        <a:rPr lang="de-DE" i="1">
                           <a:latin typeface="Cambria Math" panose="02040503050406030204" pitchFamily="18" charset="0"/>
                         </a:rPr>
                         <m:t>=</m:t>
                       </m:r>
+                      <m:nary>
+                        <m:naryPr>
+                          <m:chr m:val="∑"/>
+                          <m:supHide m:val="on"/>
+                          <m:ctrlPr>
+                            <a:rPr lang="de-DE" i="1" smtClean="0">
+                              <a:latin typeface="Cambria Math" panose="02040503050406030204" pitchFamily="18" charset="0"/>
+                            </a:rPr>
+                          </m:ctrlPr>
+                        </m:naryPr>
+                        <m:sub>
+                          <m:r>
+                            <m:rPr>
+                              <m:brk m:alnAt="7"/>
+                            </m:rPr>
+                            <a:rPr lang="de-DE" b="0" i="1" smtClean="0">
+                              <a:latin typeface="Cambria Math" panose="02040503050406030204" pitchFamily="18" charset="0"/>
+                            </a:rPr>
+                            <m:t>𝑗</m:t>
+                          </m:r>
+                          <m:r>
+                            <a:rPr lang="de-DE" b="0" i="1" smtClean="0">
+                              <a:latin typeface="Cambria Math" panose="02040503050406030204" pitchFamily="18" charset="0"/>
+                              <a:ea typeface="Cambria Math" panose="02040503050406030204" pitchFamily="18" charset="0"/>
+                            </a:rPr>
+                            <m:t>≠</m:t>
+                          </m:r>
+                          <m:r>
+                            <a:rPr lang="de-DE" b="0" i="1" smtClean="0">
+                              <a:latin typeface="Cambria Math" panose="02040503050406030204" pitchFamily="18" charset="0"/>
+                            </a:rPr>
+                            <m:t>𝑖</m:t>
+                          </m:r>
+                        </m:sub>
+                        <m:sup/>
+                        <m:e>
+                          <m:sSub>
+                            <m:sSubPr>
+                              <m:ctrlPr>
+                                <a:rPr lang="de-DE" i="1" smtClean="0">
+                                  <a:latin typeface="Cambria Math" panose="02040503050406030204" pitchFamily="18" charset="0"/>
+                                </a:rPr>
+                              </m:ctrlPr>
+                            </m:sSubPr>
+                            <m:e>
+                              <m:acc>
+                                <m:accPr>
+                                  <m:chr m:val="̂"/>
+                                  <m:ctrlPr>
+                                    <a:rPr lang="de-DE" i="1" smtClean="0">
+                                      <a:latin typeface="Cambria Math" panose="02040503050406030204" pitchFamily="18" charset="0"/>
+                                    </a:rPr>
+                                  </m:ctrlPr>
+                                </m:accPr>
+                                <m:e>
+                                  <m:r>
+                                    <a:rPr lang="de-DE" b="0" i="1" smtClean="0">
+                                      <a:latin typeface="Cambria Math" panose="02040503050406030204" pitchFamily="18" charset="0"/>
+                                    </a:rPr>
+                                    <m:t>𝑣</m:t>
+                                  </m:r>
+                                </m:e>
+                              </m:acc>
+                            </m:e>
+                            <m:sub>
+                              <m:r>
+                                <a:rPr lang="de-DE" b="0" i="1" smtClean="0">
+                                  <a:latin typeface="Cambria Math" panose="02040503050406030204" pitchFamily="18" charset="0"/>
+                                </a:rPr>
+                                <m:t>𝑗</m:t>
+                              </m:r>
+                            </m:sub>
+                          </m:sSub>
+                          <m:r>
+                            <a:rPr lang="de-DE" b="0" i="1" smtClean="0">
+                              <a:latin typeface="Cambria Math" panose="02040503050406030204" pitchFamily="18" charset="0"/>
+                            </a:rPr>
+                            <m:t>(</m:t>
+                          </m:r>
+                          <m:r>
+                            <m:rPr>
+                              <m:sty m:val="p"/>
+                            </m:rPr>
+                            <a:rPr lang="el-GR" i="1">
+                              <a:latin typeface="Cambria Math" panose="02040503050406030204" pitchFamily="18" charset="0"/>
+                            </a:rPr>
+                            <m:t>χ</m:t>
+                          </m:r>
+                          <m:r>
+                            <a:rPr lang="de-DE" b="0" i="1" smtClean="0">
+                              <a:latin typeface="Cambria Math" panose="02040503050406030204" pitchFamily="18" charset="0"/>
+                            </a:rPr>
+                            <m:t>(</m:t>
+                          </m:r>
+                          <m:sSub>
+                            <m:sSubPr>
+                              <m:ctrlPr>
+                                <a:rPr lang="de-DE" b="0" i="1" smtClean="0">
+                                  <a:latin typeface="Cambria Math" panose="02040503050406030204" pitchFamily="18" charset="0"/>
+                                </a:rPr>
+                              </m:ctrlPr>
+                            </m:sSubPr>
+                            <m:e>
+                              <m:acc>
+                                <m:accPr>
+                                  <m:chr m:val="̂"/>
+                                  <m:ctrlPr>
+                                    <a:rPr lang="de-DE" b="0" i="1" smtClean="0">
+                                      <a:latin typeface="Cambria Math" panose="02040503050406030204" pitchFamily="18" charset="0"/>
+                                    </a:rPr>
+                                  </m:ctrlPr>
+                                </m:accPr>
+                                <m:e>
+                                  <m:r>
+                                    <a:rPr lang="de-DE" b="0" i="1" smtClean="0">
+                                      <a:latin typeface="Cambria Math" panose="02040503050406030204" pitchFamily="18" charset="0"/>
+                                    </a:rPr>
+                                    <m:t>𝑣</m:t>
+                                  </m:r>
+                                </m:e>
+                              </m:acc>
+                            </m:e>
+                            <m:sub>
+                              <m:r>
+                                <a:rPr lang="de-DE" b="0" i="1" smtClean="0">
+                                  <a:latin typeface="Cambria Math" panose="02040503050406030204" pitchFamily="18" charset="0"/>
+                                </a:rPr>
+                                <m:t>−</m:t>
+                              </m:r>
+                              <m:r>
+                                <a:rPr lang="de-DE" b="0" i="1" smtClean="0">
+                                  <a:latin typeface="Cambria Math" panose="02040503050406030204" pitchFamily="18" charset="0"/>
+                                </a:rPr>
+                                <m:t>𝑖</m:t>
+                              </m:r>
+                            </m:sub>
+                          </m:sSub>
+                          <m:r>
+                            <a:rPr lang="de-DE" b="0" i="1" smtClean="0">
+                              <a:latin typeface="Cambria Math" panose="02040503050406030204" pitchFamily="18" charset="0"/>
+                            </a:rPr>
+                            <m:t>))</m:t>
+                          </m:r>
+                        </m:e>
+                      </m:nary>
                       <m:r>
                         <a:rPr lang="de-DE" b="0" i="1" smtClean="0">
                           <a:latin typeface="Cambria Math" panose="02040503050406030204" pitchFamily="18" charset="0"/>
                         </a:rPr>
-                        <m:t>𝐴</m:t>
+                        <m:t>−</m:t>
                       </m:r>
+                      <m:nary>
+                        <m:naryPr>
+                          <m:chr m:val="∑"/>
+                          <m:supHide m:val="on"/>
+                          <m:ctrlPr>
+                            <a:rPr lang="de-DE" i="1">
+                              <a:latin typeface="Cambria Math" panose="02040503050406030204" pitchFamily="18" charset="0"/>
+                            </a:rPr>
+                          </m:ctrlPr>
+                        </m:naryPr>
+                        <m:sub>
+                          <m:r>
+                            <m:rPr>
+                              <m:brk m:alnAt="7"/>
+                            </m:rPr>
+                            <a:rPr lang="de-DE" i="1">
+                              <a:latin typeface="Cambria Math" panose="02040503050406030204" pitchFamily="18" charset="0"/>
+                            </a:rPr>
+                            <m:t>𝑗</m:t>
+                          </m:r>
+                          <m:r>
+                            <a:rPr lang="de-DE" i="1">
+                              <a:latin typeface="Cambria Math" panose="02040503050406030204" pitchFamily="18" charset="0"/>
+                              <a:ea typeface="Cambria Math" panose="02040503050406030204" pitchFamily="18" charset="0"/>
+                            </a:rPr>
+                            <m:t>≠</m:t>
+                          </m:r>
+                          <m:r>
+                            <a:rPr lang="de-DE" i="1">
+                              <a:latin typeface="Cambria Math" panose="02040503050406030204" pitchFamily="18" charset="0"/>
+                            </a:rPr>
+                            <m:t>𝑖</m:t>
+                          </m:r>
+                        </m:sub>
+                        <m:sup/>
+                        <m:e>
+                          <m:sSub>
+                            <m:sSubPr>
+                              <m:ctrlPr>
+                                <a:rPr lang="de-DE" i="1">
+                                  <a:latin typeface="Cambria Math" panose="02040503050406030204" pitchFamily="18" charset="0"/>
+                                </a:rPr>
+                              </m:ctrlPr>
+                            </m:sSubPr>
+                            <m:e>
+                              <m:acc>
+                                <m:accPr>
+                                  <m:chr m:val="̂"/>
+                                  <m:ctrlPr>
+                                    <a:rPr lang="de-DE" i="1">
+                                      <a:latin typeface="Cambria Math" panose="02040503050406030204" pitchFamily="18" charset="0"/>
+                                    </a:rPr>
+                                  </m:ctrlPr>
+                                </m:accPr>
+                                <m:e>
+                                  <m:r>
+                                    <a:rPr lang="de-DE" i="1">
+                                      <a:latin typeface="Cambria Math" panose="02040503050406030204" pitchFamily="18" charset="0"/>
+                                    </a:rPr>
+                                    <m:t>𝑣</m:t>
+                                  </m:r>
+                                </m:e>
+                              </m:acc>
+                            </m:e>
+                            <m:sub>
+                              <m:r>
+                                <a:rPr lang="de-DE" i="1">
+                                  <a:latin typeface="Cambria Math" panose="02040503050406030204" pitchFamily="18" charset="0"/>
+                                </a:rPr>
+                                <m:t>𝑗</m:t>
+                              </m:r>
+                            </m:sub>
+                          </m:sSub>
+                          <m:r>
+                            <a:rPr lang="de-DE" i="1">
+                              <a:latin typeface="Cambria Math" panose="02040503050406030204" pitchFamily="18" charset="0"/>
+                            </a:rPr>
+                            <m:t>(</m:t>
+                          </m:r>
+                          <m:r>
+                            <m:rPr>
+                              <m:sty m:val="p"/>
+                            </m:rPr>
+                            <a:rPr lang="el-GR" i="1">
+                              <a:latin typeface="Cambria Math" panose="02040503050406030204" pitchFamily="18" charset="0"/>
+                            </a:rPr>
+                            <m:t>χ</m:t>
+                          </m:r>
+                          <m:r>
+                            <a:rPr lang="de-DE" i="1">
+                              <a:latin typeface="Cambria Math" panose="02040503050406030204" pitchFamily="18" charset="0"/>
+                            </a:rPr>
+                            <m:t>(</m:t>
+                          </m:r>
+                          <m:acc>
+                            <m:accPr>
+                              <m:chr m:val="̂"/>
+                              <m:ctrlPr>
+                                <a:rPr lang="de-DE" i="1">
+                                  <a:latin typeface="Cambria Math" panose="02040503050406030204" pitchFamily="18" charset="0"/>
+                                </a:rPr>
+                              </m:ctrlPr>
+                            </m:accPr>
+                            <m:e>
+                              <m:r>
+                                <a:rPr lang="de-DE" i="1">
+                                  <a:latin typeface="Cambria Math" panose="02040503050406030204" pitchFamily="18" charset="0"/>
+                                </a:rPr>
+                                <m:t>𝑣</m:t>
+                              </m:r>
+                            </m:e>
+                          </m:acc>
+                          <m:r>
+                            <a:rPr lang="de-DE" i="1">
+                              <a:latin typeface="Cambria Math" panose="02040503050406030204" pitchFamily="18" charset="0"/>
+                            </a:rPr>
+                            <m:t>))</m:t>
+                          </m:r>
+                        </m:e>
+                      </m:nary>
                     </m:oMath>
                   </m:oMathPara>
                 </a14:m>
-                <a:endParaRPr lang="de-DE" b="0" dirty="0" smtClean="0"/>
+                <a:endParaRPr lang="de-DE" i="1" dirty="0">
+                  <a:latin typeface="Cambria Math" panose="02040503050406030204" pitchFamily="18" charset="0"/>
+                </a:endParaRPr>
               </a:p>
               <a:p>
-                <a:pPr/>
-                <a:endParaRPr lang="de-DE" dirty="0" smtClean="0"/>
-              </a:p>
-              <a:p>
-                <a:pPr/>
+                <a:pPr marL="0" indent="0">
+                  <a:buNone/>
+                </a:pPr>
                 <a14:m>
                   <m:oMathPara xmlns:m="http://schemas.openxmlformats.org/officeDocument/2006/math">
                     <m:oMathParaPr>
@@ -5701,7 +6677,7 @@
                       <m:sSub>
                         <m:sSubPr>
                           <m:ctrlPr>
-                            <a:rPr lang="de-DE" i="1">
+                            <a:rPr lang="de-DE" i="1" smtClean="0">
                               <a:latin typeface="Cambria Math" panose="02040503050406030204" pitchFamily="18" charset="0"/>
                             </a:rPr>
                           </m:ctrlPr>
@@ -5756,13 +6732,7 @@
                         <a:rPr lang="de-DE" i="1">
                           <a:latin typeface="Cambria Math" panose="02040503050406030204" pitchFamily="18" charset="0"/>
                         </a:rPr>
-                        <m:t>=</m:t>
-                      </m:r>
-                      <m:r>
-                        <a:rPr lang="de-DE" i="1">
-                          <a:latin typeface="Cambria Math" panose="02040503050406030204" pitchFamily="18" charset="0"/>
-                        </a:rPr>
-                        <m:t>−21−0=−21</m:t>
+                        <m:t>=−21−0=−21</m:t>
                       </m:r>
                     </m:oMath>
                   </m:oMathPara>
@@ -5770,7 +6740,9 @@
                 <a:endParaRPr lang="de-DE" dirty="0"/>
               </a:p>
               <a:p>
-                <a:pPr/>
+                <a:pPr marL="0" indent="0">
+                  <a:buNone/>
+                </a:pPr>
                 <a14:m>
                   <m:oMathPara xmlns:m="http://schemas.openxmlformats.org/officeDocument/2006/math">
                     <m:oMathParaPr>
@@ -5795,7 +6767,7 @@
                         </m:e>
                         <m:sub>
                           <m:r>
-                            <a:rPr lang="de-DE" b="0" i="1" smtClean="0">
+                            <a:rPr lang="de-DE" i="1">
                               <a:latin typeface="Cambria Math" panose="02040503050406030204" pitchFamily="18" charset="0"/>
                             </a:rPr>
                             <m:t>𝐵</m:t>
@@ -5835,43 +6807,7 @@
                         <a:rPr lang="de-DE" i="1">
                           <a:latin typeface="Cambria Math" panose="02040503050406030204" pitchFamily="18" charset="0"/>
                         </a:rPr>
-                        <m:t>=</m:t>
-                      </m:r>
-                      <m:r>
-                        <a:rPr lang="de-DE" i="1">
-                          <a:latin typeface="Cambria Math" panose="02040503050406030204" pitchFamily="18" charset="0"/>
-                        </a:rPr>
-                        <m:t>−</m:t>
-                      </m:r>
-                      <m:r>
-                        <a:rPr lang="de-DE" b="0" i="1" smtClean="0">
-                          <a:latin typeface="Cambria Math" panose="02040503050406030204" pitchFamily="18" charset="0"/>
-                        </a:rPr>
-                        <m:t>15</m:t>
-                      </m:r>
-                      <m:r>
-                        <a:rPr lang="de-DE" i="1">
-                          <a:latin typeface="Cambria Math" panose="02040503050406030204" pitchFamily="18" charset="0"/>
-                        </a:rPr>
-                        <m:t>−</m:t>
-                      </m:r>
-                      <m:r>
-                        <a:rPr lang="de-DE" b="0" i="1" smtClean="0">
-                          <a:latin typeface="Cambria Math" panose="02040503050406030204" pitchFamily="18" charset="0"/>
-                        </a:rPr>
-                        <m:t>(−15)</m:t>
-                      </m:r>
-                      <m:r>
-                        <a:rPr lang="de-DE" i="1">
-                          <a:latin typeface="Cambria Math" panose="02040503050406030204" pitchFamily="18" charset="0"/>
-                        </a:rPr>
-                        <m:t>=</m:t>
-                      </m:r>
-                      <m:r>
-                        <a:rPr lang="de-DE" b="0" i="1" smtClean="0">
-                          <a:latin typeface="Cambria Math" panose="02040503050406030204" pitchFamily="18" charset="0"/>
-                        </a:rPr>
-                        <m:t>0</m:t>
+                        <m:t>=−15−(−15)=0</m:t>
                       </m:r>
                     </m:oMath>
                   </m:oMathPara>
@@ -5879,7 +6815,9 @@
                 <a:endParaRPr lang="de-DE" dirty="0"/>
               </a:p>
               <a:p>
-                <a:pPr/>
+                <a:pPr marL="0" indent="0">
+                  <a:buNone/>
+                </a:pPr>
                 <a14:m>
                   <m:oMathPara xmlns:m="http://schemas.openxmlformats.org/officeDocument/2006/math">
                     <m:oMathParaPr>
@@ -5904,7 +6842,7 @@
                         </m:e>
                         <m:sub>
                           <m:r>
-                            <a:rPr lang="de-DE" b="0" i="1" smtClean="0">
+                            <a:rPr lang="de-DE" i="1">
                               <a:latin typeface="Cambria Math" panose="02040503050406030204" pitchFamily="18" charset="0"/>
                             </a:rPr>
                             <m:t>𝐶</m:t>
@@ -5944,43 +6882,7 @@
                         <a:rPr lang="de-DE" i="1">
                           <a:latin typeface="Cambria Math" panose="02040503050406030204" pitchFamily="18" charset="0"/>
                         </a:rPr>
-                        <m:t>=</m:t>
-                      </m:r>
-                      <m:r>
-                        <a:rPr lang="de-DE" i="1">
-                          <a:latin typeface="Cambria Math" panose="02040503050406030204" pitchFamily="18" charset="0"/>
-                        </a:rPr>
-                        <m:t>−</m:t>
-                      </m:r>
-                      <m:r>
-                        <a:rPr lang="de-DE" b="0" i="1" smtClean="0">
-                          <a:latin typeface="Cambria Math" panose="02040503050406030204" pitchFamily="18" charset="0"/>
-                        </a:rPr>
-                        <m:t>15</m:t>
-                      </m:r>
-                      <m:r>
-                        <a:rPr lang="de-DE" i="1">
-                          <a:latin typeface="Cambria Math" panose="02040503050406030204" pitchFamily="18" charset="0"/>
-                        </a:rPr>
-                        <m:t>−</m:t>
-                      </m:r>
-                      <m:r>
-                        <a:rPr lang="de-DE" b="0" i="1" smtClean="0">
-                          <a:latin typeface="Cambria Math" panose="02040503050406030204" pitchFamily="18" charset="0"/>
-                        </a:rPr>
-                        <m:t>(−15)</m:t>
-                      </m:r>
-                      <m:r>
-                        <a:rPr lang="de-DE" i="1">
-                          <a:latin typeface="Cambria Math" panose="02040503050406030204" pitchFamily="18" charset="0"/>
-                        </a:rPr>
-                        <m:t>=</m:t>
-                      </m:r>
-                      <m:r>
-                        <a:rPr lang="de-DE" b="0" i="1" smtClean="0">
-                          <a:latin typeface="Cambria Math" panose="02040503050406030204" pitchFamily="18" charset="0"/>
-                        </a:rPr>
-                        <m:t>0</m:t>
+                        <m:t>=−15−(−15)=0</m:t>
                       </m:r>
                     </m:oMath>
                   </m:oMathPara>
@@ -5988,33 +6890,404 @@
                 <a:endParaRPr lang="de-DE" dirty="0"/>
               </a:p>
               <a:p>
-                <a:pPr/>
+                <a:pPr marL="0" indent="0">
+                  <a:buNone/>
+                </a:pPr>
+                <a:br>
+                  <a:rPr lang="de-DE" dirty="0"/>
+                </a:br>
+                <a:r>
+                  <a:rPr lang="de-DE" dirty="0"/>
+                  <a:t>Individualnutzen:</a:t>
+                </a:r>
+              </a:p>
+              <a:p>
+                <a:pPr marL="0" indent="0">
+                  <a:buNone/>
+                </a:pPr>
+                <a14:m>
+                  <m:oMathPara xmlns:m="http://schemas.openxmlformats.org/officeDocument/2006/math">
+                    <m:oMathParaPr>
+                      <m:jc m:val="left"/>
+                    </m:oMathParaPr>
+                    <m:oMath xmlns:m="http://schemas.openxmlformats.org/officeDocument/2006/math">
+                      <m:sSub>
+                        <m:sSubPr>
+                          <m:ctrlPr>
+                            <a:rPr lang="de-DE" i="1" smtClean="0">
+                              <a:latin typeface="Cambria Math" panose="02040503050406030204" pitchFamily="18" charset="0"/>
+                            </a:rPr>
+                          </m:ctrlPr>
+                        </m:sSubPr>
+                        <m:e>
+                          <m:r>
+                            <a:rPr lang="de-DE" b="0" i="1" smtClean="0">
+                              <a:latin typeface="Cambria Math" panose="02040503050406030204" pitchFamily="18" charset="0"/>
+                            </a:rPr>
+                            <m:t>𝑢</m:t>
+                          </m:r>
+                        </m:e>
+                        <m:sub>
+                          <m:r>
+                            <a:rPr lang="de-DE" b="0" i="1" smtClean="0">
+                              <a:latin typeface="Cambria Math" panose="02040503050406030204" pitchFamily="18" charset="0"/>
+                            </a:rPr>
+                            <m:t>𝐴</m:t>
+                          </m:r>
+                        </m:sub>
+                      </m:sSub>
+                      <m:r>
+                        <a:rPr lang="de-DE" b="0" i="1" smtClean="0">
+                          <a:latin typeface="Cambria Math" panose="02040503050406030204" pitchFamily="18" charset="0"/>
+                        </a:rPr>
+                        <m:t>(</m:t>
+                      </m:r>
+                      <m:r>
+                        <a:rPr lang="de-DE" b="0" i="1" smtClean="0">
+                          <a:latin typeface="Cambria Math" panose="02040503050406030204" pitchFamily="18" charset="0"/>
+                        </a:rPr>
+                        <m:t>𝐴</m:t>
+                      </m:r>
+                      <m:r>
+                        <a:rPr lang="de-DE" b="0" i="1" smtClean="0">
+                          <a:latin typeface="Cambria Math" panose="02040503050406030204" pitchFamily="18" charset="0"/>
+                        </a:rPr>
+                        <m:t>, </m:t>
+                      </m:r>
+                      <m:r>
+                        <a:rPr lang="de-DE" b="0" i="1" smtClean="0">
+                          <a:latin typeface="Cambria Math" panose="02040503050406030204" pitchFamily="18" charset="0"/>
+                        </a:rPr>
+                        <m:t>𝑝</m:t>
+                      </m:r>
+                      <m:r>
+                        <a:rPr lang="de-DE" b="0" i="1" smtClean="0">
+                          <a:latin typeface="Cambria Math" panose="02040503050406030204" pitchFamily="18" charset="0"/>
+                        </a:rPr>
+                        <m:t>)=</m:t>
+                      </m:r>
+                      <m:sSub>
+                        <m:sSubPr>
+                          <m:ctrlPr>
+                            <a:rPr lang="de-DE" i="1" smtClean="0">
+                              <a:latin typeface="Cambria Math" panose="02040503050406030204" pitchFamily="18" charset="0"/>
+                            </a:rPr>
+                          </m:ctrlPr>
+                        </m:sSubPr>
+                        <m:e>
+                          <m:r>
+                            <a:rPr lang="de-DE" b="0" i="1" smtClean="0">
+                              <a:latin typeface="Cambria Math" panose="02040503050406030204" pitchFamily="18" charset="0"/>
+                            </a:rPr>
+                            <m:t>𝑢</m:t>
+                          </m:r>
+                        </m:e>
+                        <m:sub>
+                          <m:r>
+                            <a:rPr lang="de-DE" b="0" i="1" smtClean="0">
+                              <a:latin typeface="Cambria Math" panose="02040503050406030204" pitchFamily="18" charset="0"/>
+                            </a:rPr>
+                            <m:t>𝐴</m:t>
+                          </m:r>
+                        </m:sub>
+                      </m:sSub>
+                      <m:d>
+                        <m:dPr>
+                          <m:ctrlPr>
+                            <a:rPr lang="de-DE" i="1">
+                              <a:latin typeface="Cambria Math" panose="02040503050406030204" pitchFamily="18" charset="0"/>
+                            </a:rPr>
+                          </m:ctrlPr>
+                        </m:dPr>
+                        <m:e>
+                          <m:r>
+                            <a:rPr lang="de-DE" i="1">
+                              <a:latin typeface="Cambria Math" panose="02040503050406030204" pitchFamily="18" charset="0"/>
+                            </a:rPr>
+                            <m:t>𝐴</m:t>
+                          </m:r>
+                        </m:e>
+                      </m:d>
+                      <m:r>
+                        <a:rPr lang="de-DE" i="1">
+                          <a:latin typeface="Cambria Math" panose="02040503050406030204" pitchFamily="18" charset="0"/>
+                        </a:rPr>
+                        <m:t>−</m:t>
+                      </m:r>
+                      <m:sSub>
+                        <m:sSubPr>
+                          <m:ctrlPr>
+                            <a:rPr lang="de-DE" i="1">
+                              <a:latin typeface="Cambria Math" panose="02040503050406030204" pitchFamily="18" charset="0"/>
+                            </a:rPr>
+                          </m:ctrlPr>
+                        </m:sSubPr>
+                        <m:e>
+                          <m:r>
+                            <a:rPr lang="de-DE" i="1">
+                              <a:latin typeface="Cambria Math" panose="02040503050406030204" pitchFamily="18" charset="0"/>
+                            </a:rPr>
+                            <m:t>𝑝</m:t>
+                          </m:r>
+                        </m:e>
+                        <m:sub>
+                          <m:r>
+                            <a:rPr lang="de-DE" b="0" i="1" smtClean="0">
+                              <a:latin typeface="Cambria Math" panose="02040503050406030204" pitchFamily="18" charset="0"/>
+                            </a:rPr>
+                            <m:t>𝐴</m:t>
+                          </m:r>
+                        </m:sub>
+                      </m:sSub>
+                      <m:r>
+                        <a:rPr lang="de-DE" b="0" i="1" smtClean="0">
+                          <a:latin typeface="Cambria Math" panose="02040503050406030204" pitchFamily="18" charset="0"/>
+                        </a:rPr>
+                        <m:t>=−15+21=6</m:t>
+                      </m:r>
+                    </m:oMath>
+                  </m:oMathPara>
+                </a14:m>
+                <a:endParaRPr lang="de-DE" dirty="0"/>
+              </a:p>
+              <a:p>
+                <a:pPr marL="0" indent="0">
+                  <a:buNone/>
+                </a:pPr>
+                <a14:m>
+                  <m:oMathPara xmlns:m="http://schemas.openxmlformats.org/officeDocument/2006/math">
+                    <m:oMathParaPr>
+                      <m:jc m:val="left"/>
+                    </m:oMathParaPr>
+                    <m:oMath xmlns:m="http://schemas.openxmlformats.org/officeDocument/2006/math">
+                      <m:sSub>
+                        <m:sSubPr>
+                          <m:ctrlPr>
+                            <a:rPr lang="de-DE" i="1" smtClean="0">
+                              <a:latin typeface="Cambria Math" panose="02040503050406030204" pitchFamily="18" charset="0"/>
+                            </a:rPr>
+                          </m:ctrlPr>
+                        </m:sSubPr>
+                        <m:e>
+                          <m:r>
+                            <a:rPr lang="de-DE" b="0" i="1" smtClean="0">
+                              <a:latin typeface="Cambria Math" panose="02040503050406030204" pitchFamily="18" charset="0"/>
+                            </a:rPr>
+                            <m:t>𝑢</m:t>
+                          </m:r>
+                        </m:e>
+                        <m:sub>
+                          <m:r>
+                            <a:rPr lang="de-DE" b="0" i="1" smtClean="0">
+                              <a:latin typeface="Cambria Math" panose="02040503050406030204" pitchFamily="18" charset="0"/>
+                            </a:rPr>
+                            <m:t>𝐵</m:t>
+                          </m:r>
+                        </m:sub>
+                      </m:sSub>
+                      <m:r>
+                        <a:rPr lang="de-DE" b="0" i="1" smtClean="0">
+                          <a:latin typeface="Cambria Math" panose="02040503050406030204" pitchFamily="18" charset="0"/>
+                        </a:rPr>
+                        <m:t>(</m:t>
+                      </m:r>
+                      <m:r>
+                        <a:rPr lang="de-DE" b="0" i="1" smtClean="0">
+                          <a:latin typeface="Cambria Math" panose="02040503050406030204" pitchFamily="18" charset="0"/>
+                        </a:rPr>
+                        <m:t>𝐴</m:t>
+                      </m:r>
+                      <m:r>
+                        <a:rPr lang="de-DE" b="0" i="1" smtClean="0">
+                          <a:latin typeface="Cambria Math" panose="02040503050406030204" pitchFamily="18" charset="0"/>
+                        </a:rPr>
+                        <m:t>,</m:t>
+                      </m:r>
+                      <m:r>
+                        <a:rPr lang="de-DE" b="0" i="1" smtClean="0">
+                          <a:latin typeface="Cambria Math" panose="02040503050406030204" pitchFamily="18" charset="0"/>
+                        </a:rPr>
+                        <m:t>𝑝</m:t>
+                      </m:r>
+                      <m:r>
+                        <a:rPr lang="de-DE" b="0" i="1" smtClean="0">
+                          <a:latin typeface="Cambria Math" panose="02040503050406030204" pitchFamily="18" charset="0"/>
+                        </a:rPr>
+                        <m:t>)=</m:t>
+                      </m:r>
+                      <m:sSub>
+                        <m:sSubPr>
+                          <m:ctrlPr>
+                            <a:rPr lang="de-DE" b="0" i="1" smtClean="0">
+                              <a:latin typeface="Cambria Math" panose="02040503050406030204" pitchFamily="18" charset="0"/>
+                            </a:rPr>
+                          </m:ctrlPr>
+                        </m:sSubPr>
+                        <m:e>
+                          <m:r>
+                            <a:rPr lang="de-DE" b="0" i="1" smtClean="0">
+                              <a:latin typeface="Cambria Math" panose="02040503050406030204" pitchFamily="18" charset="0"/>
+                            </a:rPr>
+                            <m:t>𝑢</m:t>
+                          </m:r>
+                        </m:e>
+                        <m:sub>
+                          <m:r>
+                            <a:rPr lang="de-DE" b="0" i="1" smtClean="0">
+                              <a:latin typeface="Cambria Math" panose="02040503050406030204" pitchFamily="18" charset="0"/>
+                            </a:rPr>
+                            <m:t>𝐵</m:t>
+                          </m:r>
+                        </m:sub>
+                      </m:sSub>
+                      <m:d>
+                        <m:dPr>
+                          <m:ctrlPr>
+                            <a:rPr lang="de-DE" b="0" i="1" smtClean="0">
+                              <a:latin typeface="Cambria Math" panose="02040503050406030204" pitchFamily="18" charset="0"/>
+                            </a:rPr>
+                          </m:ctrlPr>
+                        </m:dPr>
+                        <m:e>
+                          <m:r>
+                            <a:rPr lang="de-DE" b="0" i="1" smtClean="0">
+                              <a:latin typeface="Cambria Math" panose="02040503050406030204" pitchFamily="18" charset="0"/>
+                            </a:rPr>
+                            <m:t>𝐴</m:t>
+                          </m:r>
+                        </m:e>
+                      </m:d>
+                      <m:r>
+                        <a:rPr lang="de-DE" b="0" i="1" smtClean="0">
+                          <a:latin typeface="Cambria Math" panose="02040503050406030204" pitchFamily="18" charset="0"/>
+                        </a:rPr>
+                        <m:t>−</m:t>
+                      </m:r>
+                      <m:sSub>
+                        <m:sSubPr>
+                          <m:ctrlPr>
+                            <a:rPr lang="de-DE" b="0" i="1" smtClean="0">
+                              <a:latin typeface="Cambria Math" panose="02040503050406030204" pitchFamily="18" charset="0"/>
+                            </a:rPr>
+                          </m:ctrlPr>
+                        </m:sSubPr>
+                        <m:e>
+                          <m:r>
+                            <a:rPr lang="de-DE" b="0" i="1" smtClean="0">
+                              <a:latin typeface="Cambria Math" panose="02040503050406030204" pitchFamily="18" charset="0"/>
+                            </a:rPr>
+                            <m:t>𝑝</m:t>
+                          </m:r>
+                        </m:e>
+                        <m:sub>
+                          <m:r>
+                            <a:rPr lang="de-DE" b="0" i="1" smtClean="0">
+                              <a:latin typeface="Cambria Math" panose="02040503050406030204" pitchFamily="18" charset="0"/>
+                            </a:rPr>
+                            <m:t>𝐵</m:t>
+                          </m:r>
+                        </m:sub>
+                      </m:sSub>
+                      <m:r>
+                        <a:rPr lang="de-DE" b="0" i="1" smtClean="0">
+                          <a:latin typeface="Cambria Math" panose="02040503050406030204" pitchFamily="18" charset="0"/>
+                        </a:rPr>
+                        <m:t>=0</m:t>
+                      </m:r>
+                    </m:oMath>
+                  </m:oMathPara>
+                </a14:m>
+                <a:endParaRPr lang="de-DE" dirty="0"/>
+              </a:p>
+              <a:p>
+                <a:pPr marL="0" indent="0">
+                  <a:buNone/>
+                </a:pPr>
+                <a14:m>
+                  <m:oMathPara xmlns:m="http://schemas.openxmlformats.org/officeDocument/2006/math">
+                    <m:oMathParaPr>
+                      <m:jc m:val="left"/>
+                    </m:oMathParaPr>
+                    <m:oMath xmlns:m="http://schemas.openxmlformats.org/officeDocument/2006/math">
+                      <m:sSub>
+                        <m:sSubPr>
+                          <m:ctrlPr>
+                            <a:rPr lang="de-DE" i="1">
+                              <a:latin typeface="Cambria Math" panose="02040503050406030204" pitchFamily="18" charset="0"/>
+                            </a:rPr>
+                          </m:ctrlPr>
+                        </m:sSubPr>
+                        <m:e>
+                          <m:r>
+                            <a:rPr lang="de-DE" i="1">
+                              <a:latin typeface="Cambria Math" panose="02040503050406030204" pitchFamily="18" charset="0"/>
+                            </a:rPr>
+                            <m:t>𝑢</m:t>
+                          </m:r>
+                        </m:e>
+                        <m:sub>
+                          <m:r>
+                            <a:rPr lang="de-DE" b="0" i="1" smtClean="0">
+                              <a:latin typeface="Cambria Math" panose="02040503050406030204" pitchFamily="18" charset="0"/>
+                            </a:rPr>
+                            <m:t>𝐶</m:t>
+                          </m:r>
+                        </m:sub>
+                      </m:sSub>
+                      <m:r>
+                        <a:rPr lang="de-DE" b="0" i="1" smtClean="0">
+                          <a:latin typeface="Cambria Math" panose="02040503050406030204" pitchFamily="18" charset="0"/>
+                        </a:rPr>
+                        <m:t>(</m:t>
+                      </m:r>
+                      <m:r>
+                        <a:rPr lang="de-DE" b="0" i="1" smtClean="0">
+                          <a:latin typeface="Cambria Math" panose="02040503050406030204" pitchFamily="18" charset="0"/>
+                        </a:rPr>
+                        <m:t>𝐴</m:t>
+                      </m:r>
+                      <m:r>
+                        <a:rPr lang="de-DE" b="0" i="1" smtClean="0">
+                          <a:latin typeface="Cambria Math" panose="02040503050406030204" pitchFamily="18" charset="0"/>
+                        </a:rPr>
+                        <m:t>,</m:t>
+                      </m:r>
+                      <m:r>
+                        <a:rPr lang="de-DE" b="0" i="1" smtClean="0">
+                          <a:latin typeface="Cambria Math" panose="02040503050406030204" pitchFamily="18" charset="0"/>
+                        </a:rPr>
+                        <m:t>𝑝</m:t>
+                      </m:r>
+                      <m:r>
+                        <a:rPr lang="de-DE" b="0" i="1" smtClean="0">
+                          <a:latin typeface="Cambria Math" panose="02040503050406030204" pitchFamily="18" charset="0"/>
+                        </a:rPr>
+                        <m:t>)=0</m:t>
+                      </m:r>
+                    </m:oMath>
+                  </m:oMathPara>
+                </a14:m>
                 <a:endParaRPr lang="de-DE" dirty="0"/>
               </a:p>
             </p:txBody>
           </p:sp>
         </mc:Choice>
-        <mc:Fallback>
+        <mc:Fallback xmlns="">
           <p:sp>
             <p:nvSpPr>
-              <p:cNvPr id="3" name="Textfeld 2"/>
-              <p:cNvSpPr txBox="1">
-                <a:spLocks noRot="1" noChangeAspect="1" noMove="1" noResize="1" noEditPoints="1" noAdjustHandles="1" noChangeArrowheads="1" noChangeShapeType="1" noTextEdit="1"/>
+              <p:cNvPr id="3" name="Inhaltsplatzhalter 2"/>
+              <p:cNvSpPr>
+                <a:spLocks noGrp="1" noRot="1" noChangeAspect="1" noMove="1" noResize="1" noEditPoints="1" noAdjustHandles="1" noChangeArrowheads="1" noChangeShapeType="1" noTextEdit="1"/>
               </p:cNvSpPr>
-              <p:nvPr/>
+              <p:nvPr>
+                <p:ph idx="1"/>
+              </p:nvPr>
             </p:nvSpPr>
             <p:spPr>
-              <a:xfrm>
-                <a:off x="1675398" y="3785937"/>
-                <a:ext cx="8648699" cy="1754326"/>
-              </a:xfrm>
-              <a:prstGeom prst="rect">
-                <a:avLst/>
-              </a:prstGeom>
               <a:blipFill>
-                <a:blip r:embed="rId3"/>
+                <a:blip r:embed="rId2"/>
                 <a:stretch>
-                  <a:fillRect t="-1389"/>
+                  <a:fillRect l="-1515" t="-1667"/>
                 </a:stretch>
               </a:blipFill>
             </p:spPr>
@@ -6036,7 +7309,7 @@
     </p:spTree>
     <p:extLst>
       <p:ext uri="{BB962C8B-B14F-4D97-AF65-F5344CB8AC3E}">
-        <p14:creationId xmlns:p14="http://schemas.microsoft.com/office/powerpoint/2010/main" val="3795914307"/>
+        <p14:creationId xmlns:p14="http://schemas.microsoft.com/office/powerpoint/2010/main" val="3558960848"/>
       </p:ext>
     </p:extLst>
   </p:cSld>
@@ -6046,7 +7319,7 @@
 </p:sld>
 </file>
 
-<file path=ppt/slides/slide6.xml><?xml version="1.0" encoding="utf-8"?>
+<file path=ppt/slides/slide7.xml><?xml version="1.0" encoding="utf-8"?>
 <p:sld xmlns:a="http://schemas.openxmlformats.org/drawingml/2006/main" xmlns:r="http://schemas.openxmlformats.org/officeDocument/2006/relationships" xmlns:p="http://schemas.openxmlformats.org/presentationml/2006/main">
   <p:cSld>
     <p:spTree>
@@ -6079,15 +7352,14 @@
           <a:lstStyle/>
           <a:p>
             <a:r>
-              <a:rPr lang="de-DE" dirty="0" smtClean="0"/>
-              <a:t>Aufgabe c</a:t>
+              <a:rPr lang="de-DE" dirty="0"/>
+              <a:t>Aufgabe 1c</a:t>
             </a:r>
-            <a:endParaRPr lang="de-DE" dirty="0"/>
           </a:p>
         </p:txBody>
       </p:sp>
-      <mc:AlternateContent xmlns:mc="http://schemas.openxmlformats.org/markup-compatibility/2006">
-        <mc:Choice xmlns:a14="http://schemas.microsoft.com/office/drawing/2010/main" Requires="a14">
+      <mc:AlternateContent xmlns:mc="http://schemas.openxmlformats.org/markup-compatibility/2006" xmlns:a14="http://schemas.microsoft.com/office/drawing/2010/main">
+        <mc:Choice Requires="a14">
           <p:sp>
             <p:nvSpPr>
               <p:cNvPr id="3" name="Inhaltsplatzhalter 2"/>
@@ -6109,7 +7381,7 @@
               <a:lstStyle/>
               <a:p>
                 <a:r>
-                  <a:rPr lang="de-DE" dirty="0" smtClean="0"/>
+                  <a:rPr lang="de-DE" dirty="0"/>
                   <a:t>Was passiert, wenn ausgewählte Agenten ihre Bewertung nach oben oder unten verändern hinsichtlich der Auszahlungen?</a:t>
                 </a:r>
               </a:p>
@@ -6117,17 +7389,17 @@
                 <a:endParaRPr lang="de-DE" dirty="0"/>
               </a:p>
               <a:p>
-                <a:endParaRPr lang="de-DE" dirty="0" smtClean="0"/>
+                <a:endParaRPr lang="de-DE" dirty="0"/>
               </a:p>
               <a:p>
                 <a:endParaRPr lang="de-DE" dirty="0"/>
               </a:p>
               <a:p>
-                <a:endParaRPr lang="de-DE" dirty="0" smtClean="0"/>
+                <a:endParaRPr lang="de-DE" dirty="0"/>
               </a:p>
               <a:p>
                 <a:r>
-                  <a:rPr lang="de-DE" dirty="0" smtClean="0"/>
+                  <a:rPr lang="de-DE" dirty="0"/>
                   <a:t>-21 &lt; </a:t>
                 </a:r>
                 <a14:m>
@@ -6160,16 +7432,8 @@
                   </m:oMath>
                 </a14:m>
                 <a:r>
-                  <a:rPr lang="de-DE" dirty="0" smtClean="0"/>
-                  <a:t> &lt; 0 =&gt; Auszahlung = -21 ,  wenn </a:t>
-                </a:r>
-                <a:r>
                   <a:rPr lang="de-DE" dirty="0"/>
-                  <a:t>-21 </a:t>
-                </a:r>
-                <a:r>
-                  <a:rPr lang="de-DE" dirty="0" smtClean="0"/>
-                  <a:t>&gt; </a:t>
+                  <a:t> &lt; 0 =&gt; Auszahlung = -21 ,  wenn -21 &gt; </a:t>
                 </a:r>
                 <a14:m>
                   <m:oMath xmlns:m="http://schemas.openxmlformats.org/officeDocument/2006/math">
@@ -6201,18 +7465,14 @@
                   </m:oMath>
                 </a14:m>
                 <a:r>
-                  <a:rPr lang="de-DE" dirty="0" smtClean="0"/>
+                  <a:rPr lang="de-DE" dirty="0"/>
                   <a:t> dann Auszahlung = 0</a:t>
                 </a:r>
               </a:p>
               <a:p>
                 <a:r>
-                  <a:rPr lang="de-DE" dirty="0" smtClean="0"/>
-                  <a:t>-36 </a:t>
-                </a:r>
-                <a:r>
                   <a:rPr lang="de-DE" dirty="0"/>
-                  <a:t>&lt; </a:t>
+                  <a:t>-36 &lt; </a:t>
                 </a:r>
                 <a14:m>
                   <m:oMath xmlns:m="http://schemas.openxmlformats.org/officeDocument/2006/math">
@@ -6245,11 +7505,7 @@
                 </a14:m>
                 <a:r>
                   <a:rPr lang="de-DE" dirty="0"/>
-                  <a:t> &lt; </a:t>
-                </a:r>
-                <a:r>
-                  <a:rPr lang="de-DE" dirty="0" smtClean="0"/>
-                  <a:t>-15 =&gt; Auszahlung = 0, Auszahlung für A =  Wert von </a:t>
+                  <a:t> &lt; -15 =&gt; Auszahlung = 0, Auszahlung für A =  Wert von </a:t>
                 </a:r>
                 <a14:m>
                   <m:oMath xmlns:m="http://schemas.openxmlformats.org/officeDocument/2006/math">
@@ -6281,7 +7537,7 @@
                   </m:oMath>
                 </a14:m>
                 <a:r>
-                  <a:rPr lang="de-DE" dirty="0" smtClean="0"/>
+                  <a:rPr lang="de-DE" dirty="0"/>
                   <a:t>, </a:t>
                 </a:r>
                 <a14:m>
@@ -6314,7 +7570,7 @@
                   </m:oMath>
                 </a14:m>
                 <a:r>
-                  <a:rPr lang="de-DE" dirty="0" smtClean="0"/>
+                  <a:rPr lang="de-DE" dirty="0"/>
                   <a:t> &lt; -36 =&gt; Auszahlung A = -36</a:t>
                 </a:r>
               </a:p>
@@ -6350,11 +7606,7 @@
                 </a14:m>
                 <a:r>
                   <a:rPr lang="de-DE" dirty="0"/>
-                  <a:t> &lt; </a:t>
-                </a:r>
-                <a:r>
-                  <a:rPr lang="de-DE" dirty="0" smtClean="0"/>
-                  <a:t>-21 =&gt; Auszahlung = 0, Auszahlung für A = -21, -15 &gt; </a:t>
+                  <a:t> &lt; -21 =&gt; Auszahlung = 0, Auszahlung für A = -21, -15 &gt; </a:t>
                 </a:r>
                 <a14:m>
                   <m:oMath xmlns:m="http://schemas.openxmlformats.org/officeDocument/2006/math">
@@ -6387,23 +7639,7 @@
                 </a14:m>
                 <a:r>
                   <a:rPr lang="de-DE" dirty="0"/>
-                  <a:t> </a:t>
-                </a:r>
-                <a:r>
-                  <a:rPr lang="de-DE" dirty="0" smtClean="0"/>
-                  <a:t>&gt; </a:t>
-                </a:r>
-                <a:r>
-                  <a:rPr lang="de-DE" dirty="0"/>
-                  <a:t>-21 </a:t>
-                </a:r>
-                <a:r>
-                  <a:rPr lang="de-DE" dirty="0" smtClean="0"/>
-                  <a:t> =&gt; Auszahlung A = </a:t>
-                </a:r>
-                <a:r>
-                  <a:rPr lang="de-DE" dirty="0"/>
-                  <a:t>Wert von </a:t>
+                  <a:t> &gt; -21  =&gt; Auszahlung A = Wert von </a:t>
                 </a:r>
                 <a14:m>
                   <m:oMath xmlns:m="http://schemas.openxmlformats.org/officeDocument/2006/math">
@@ -6434,11 +7670,11 @@
                     </m:sSub>
                   </m:oMath>
                 </a14:m>
-                <a:endParaRPr lang="de-DE" dirty="0" smtClean="0"/>
+                <a:endParaRPr lang="de-DE" dirty="0"/>
               </a:p>
               <a:p>
                 <a:r>
-                  <a:rPr lang="de-DE" dirty="0" smtClean="0"/>
+                  <a:rPr lang="de-DE" dirty="0"/>
                   <a:t>=&gt; Anfälligkeit auf Absprachen!!!</a:t>
                 </a:r>
               </a:p>
@@ -6448,7 +7684,7 @@
             </p:txBody>
           </p:sp>
         </mc:Choice>
-        <mc:Fallback>
+        <mc:Fallback xmlns="">
           <p:sp>
             <p:nvSpPr>
               <p:cNvPr id="3" name="Inhaltsplatzhalter 2"/>
@@ -6486,8 +7722,8 @@
           </p:sp>
         </mc:Fallback>
       </mc:AlternateContent>
-      <mc:AlternateContent xmlns:mc="http://schemas.openxmlformats.org/markup-compatibility/2006">
-        <mc:Choice xmlns:a14="http://schemas.microsoft.com/office/drawing/2010/main" Requires="a14">
+      <mc:AlternateContent xmlns:mc="http://schemas.openxmlformats.org/markup-compatibility/2006" xmlns:a14="http://schemas.microsoft.com/office/drawing/2010/main">
+        <mc:Choice Requires="a14">
           <p:graphicFrame>
             <p:nvGraphicFramePr>
               <p:cNvPr id="5" name="Tabelle 4"/>
@@ -6701,10 +7937,9 @@
                         <a:lstStyle/>
                         <a:p>
                           <a:r>
-                            <a:rPr lang="de-DE" dirty="0" smtClean="0"/>
+                            <a:rPr lang="de-DE" dirty="0"/>
                             <a:t>∑</a:t>
                           </a:r>
-                          <a:endParaRPr lang="de-DE" dirty="0"/>
                         </a:p>
                       </a:txBody>
                       <a:tcPr/>
@@ -6722,10 +7957,9 @@
                         <a:lstStyle/>
                         <a:p>
                           <a:r>
-                            <a:rPr lang="de-DE" dirty="0" smtClean="0"/>
+                            <a:rPr lang="de-DE" dirty="0"/>
                             <a:t>A</a:t>
                           </a:r>
-                          <a:endParaRPr lang="de-DE" dirty="0"/>
                         </a:p>
                       </a:txBody>
                       <a:tcPr/>
@@ -6736,10 +7970,9 @@
                         <a:lstStyle/>
                         <a:p>
                           <a:r>
-                            <a:rPr lang="de-DE" dirty="0" smtClean="0"/>
+                            <a:rPr lang="de-DE" dirty="0"/>
                             <a:t>-15</a:t>
                           </a:r>
-                          <a:endParaRPr lang="de-DE" dirty="0"/>
                         </a:p>
                       </a:txBody>
                       <a:tcPr/>
@@ -6750,10 +7983,9 @@
                         <a:lstStyle/>
                         <a:p>
                           <a:r>
-                            <a:rPr lang="de-DE" dirty="0" smtClean="0"/>
+                            <a:rPr lang="de-DE" dirty="0"/>
                             <a:t>0</a:t>
                           </a:r>
-                          <a:endParaRPr lang="de-DE" dirty="0"/>
                         </a:p>
                       </a:txBody>
                       <a:tcPr/>
@@ -6764,10 +7996,9 @@
                         <a:lstStyle/>
                         <a:p>
                           <a:r>
-                            <a:rPr lang="de-DE" dirty="0" smtClean="0"/>
+                            <a:rPr lang="de-DE" dirty="0"/>
                             <a:t>0</a:t>
                           </a:r>
-                          <a:endParaRPr lang="de-DE" dirty="0"/>
                         </a:p>
                       </a:txBody>
                       <a:tcPr/>
@@ -6778,10 +8009,9 @@
                         <a:lstStyle/>
                         <a:p>
                           <a:r>
-                            <a:rPr lang="de-DE" dirty="0" smtClean="0"/>
+                            <a:rPr lang="de-DE" dirty="0"/>
                             <a:t>-15</a:t>
                           </a:r>
-                          <a:endParaRPr lang="de-DE" dirty="0"/>
                         </a:p>
                       </a:txBody>
                       <a:tcPr/>
@@ -6799,10 +8029,9 @@
                         <a:lstStyle/>
                         <a:p>
                           <a:r>
-                            <a:rPr lang="de-DE" dirty="0" smtClean="0"/>
+                            <a:rPr lang="de-DE" dirty="0"/>
                             <a:t>B</a:t>
                           </a:r>
-                          <a:endParaRPr lang="de-DE" dirty="0"/>
                         </a:p>
                       </a:txBody>
                       <a:tcPr/>
@@ -6813,10 +8042,9 @@
                         <a:lstStyle/>
                         <a:p>
                           <a:r>
-                            <a:rPr lang="de-DE" dirty="0" smtClean="0"/>
+                            <a:rPr lang="de-DE" dirty="0"/>
                             <a:t>0</a:t>
                           </a:r>
-                          <a:endParaRPr lang="de-DE" dirty="0"/>
                         </a:p>
                       </a:txBody>
                       <a:tcPr/>
@@ -6827,10 +8055,9 @@
                         <a:lstStyle/>
                         <a:p>
                           <a:r>
-                            <a:rPr lang="de-DE" dirty="0" smtClean="0"/>
+                            <a:rPr lang="de-DE" dirty="0"/>
                             <a:t>-21</a:t>
                           </a:r>
-                          <a:endParaRPr lang="de-DE" dirty="0"/>
                         </a:p>
                       </a:txBody>
                       <a:tcPr/>
@@ -6841,10 +8068,9 @@
                         <a:lstStyle/>
                         <a:p>
                           <a:r>
-                            <a:rPr lang="de-DE" dirty="0" smtClean="0"/>
+                            <a:rPr lang="de-DE" dirty="0"/>
                             <a:t>0</a:t>
                           </a:r>
-                          <a:endParaRPr lang="de-DE" dirty="0"/>
                         </a:p>
                       </a:txBody>
                       <a:tcPr/>
@@ -6855,10 +8081,9 @@
                         <a:lstStyle/>
                         <a:p>
                           <a:r>
-                            <a:rPr lang="de-DE" dirty="0" smtClean="0"/>
+                            <a:rPr lang="de-DE" dirty="0"/>
                             <a:t>-21</a:t>
                           </a:r>
-                          <a:endParaRPr lang="de-DE" dirty="0"/>
                         </a:p>
                       </a:txBody>
                       <a:tcPr/>
@@ -6876,10 +8101,9 @@
                         <a:lstStyle/>
                         <a:p>
                           <a:r>
-                            <a:rPr lang="de-DE" dirty="0" smtClean="0"/>
+                            <a:rPr lang="de-DE" dirty="0"/>
                             <a:t>C</a:t>
                           </a:r>
-                          <a:endParaRPr lang="de-DE" dirty="0"/>
                         </a:p>
                       </a:txBody>
                       <a:tcPr/>
@@ -6890,10 +8114,9 @@
                         <a:lstStyle/>
                         <a:p>
                           <a:r>
-                            <a:rPr lang="de-DE" dirty="0" smtClean="0"/>
+                            <a:rPr lang="de-DE" dirty="0"/>
                             <a:t>0</a:t>
                           </a:r>
-                          <a:endParaRPr lang="de-DE" dirty="0"/>
                         </a:p>
                       </a:txBody>
                       <a:tcPr/>
@@ -6904,10 +8127,9 @@
                         <a:lstStyle/>
                         <a:p>
                           <a:r>
-                            <a:rPr lang="de-DE" dirty="0" smtClean="0"/>
+                            <a:rPr lang="de-DE" dirty="0"/>
                             <a:t>0</a:t>
                           </a:r>
-                          <a:endParaRPr lang="de-DE" dirty="0"/>
                         </a:p>
                       </a:txBody>
                       <a:tcPr/>
@@ -6918,10 +8140,9 @@
                         <a:lstStyle/>
                         <a:p>
                           <a:r>
-                            <a:rPr lang="de-DE" dirty="0" smtClean="0"/>
+                            <a:rPr lang="de-DE" dirty="0"/>
                             <a:t>-36</a:t>
                           </a:r>
-                          <a:endParaRPr lang="de-DE" dirty="0"/>
                         </a:p>
                       </a:txBody>
                       <a:tcPr/>
@@ -6932,10 +8153,9 @@
                         <a:lstStyle/>
                         <a:p>
                           <a:r>
-                            <a:rPr lang="de-DE" dirty="0" smtClean="0"/>
+                            <a:rPr lang="de-DE" dirty="0"/>
                             <a:t>-36</a:t>
                           </a:r>
-                          <a:endParaRPr lang="de-DE" dirty="0"/>
                         </a:p>
                       </a:txBody>
                       <a:tcPr/>
@@ -6951,7 +8171,7 @@
             </a:graphic>
           </p:graphicFrame>
         </mc:Choice>
-        <mc:Fallback>
+        <mc:Fallback xmlns="">
           <p:graphicFrame>
             <p:nvGraphicFramePr>
               <p:cNvPr id="5" name="Tabelle 4"/>

</xml_diff>